<commit_message>
updates to lessons and labs
</commit_message>
<xml_diff>
--- a/source/lessons/lsn14-15/Lsn14-15.pptx
+++ b/source/lessons/lsn14-15/Lsn14-15.pptx
@@ -7,10 +7,10 @@
     <p:sldMasterId id="2147483667" r:id="rId3"/>
   </p:sldMasterIdLst>
   <p:notesMasterIdLst>
-    <p:notesMasterId r:id="rId26"/>
+    <p:notesMasterId r:id="rId27"/>
   </p:notesMasterIdLst>
   <p:handoutMasterIdLst>
-    <p:handoutMasterId r:id="rId27"/>
+    <p:handoutMasterId r:id="rId28"/>
   </p:handoutMasterIdLst>
   <p:sldIdLst>
     <p:sldId id="352" r:id="rId4"/>
@@ -28,13 +28,14 @@
     <p:sldId id="367" r:id="rId16"/>
     <p:sldId id="370" r:id="rId17"/>
     <p:sldId id="371" r:id="rId18"/>
-    <p:sldId id="372" r:id="rId19"/>
-    <p:sldId id="374" r:id="rId20"/>
-    <p:sldId id="375" r:id="rId21"/>
-    <p:sldId id="376" r:id="rId22"/>
-    <p:sldId id="353" r:id="rId23"/>
-    <p:sldId id="358" r:id="rId24"/>
-    <p:sldId id="373" r:id="rId25"/>
+    <p:sldId id="382" r:id="rId19"/>
+    <p:sldId id="372" r:id="rId20"/>
+    <p:sldId id="374" r:id="rId21"/>
+    <p:sldId id="375" r:id="rId22"/>
+    <p:sldId id="376" r:id="rId23"/>
+    <p:sldId id="353" r:id="rId24"/>
+    <p:sldId id="358" r:id="rId25"/>
+    <p:sldId id="373" r:id="rId26"/>
   </p:sldIdLst>
   <p:sldSz cx="9144000" cy="6858000" type="screen4x3"/>
   <p:notesSz cx="7010400" cy="9296400"/>
@@ -1372,7 +1373,7 @@
           <a:p>
             <a:fld id="{834513E8-165F-4932-9E2D-FD497CB9A4FD}" type="datetimeFigureOut">
               <a:rPr lang="en-US" smtClean="0"/>
-              <a:t>7/23/2018</a:t>
+              <a:t>7/31/2018</a:t>
             </a:fld>
             <a:endParaRPr lang="en-US"/>
           </a:p>
@@ -1649,7 +1650,7 @@
           <a:p>
             <a:fld id="{834513E8-165F-4932-9E2D-FD497CB9A4FD}" type="datetimeFigureOut">
               <a:rPr lang="en-US" smtClean="0"/>
-              <a:t>7/23/2018</a:t>
+              <a:t>7/31/2018</a:t>
             </a:fld>
             <a:endParaRPr lang="en-US"/>
           </a:p>
@@ -1902,7 +1903,7 @@
           <a:p>
             <a:fld id="{834513E8-165F-4932-9E2D-FD497CB9A4FD}" type="datetimeFigureOut">
               <a:rPr lang="en-US" smtClean="0"/>
-              <a:t>7/23/2018</a:t>
+              <a:t>7/31/2018</a:t>
             </a:fld>
             <a:endParaRPr lang="en-US"/>
           </a:p>
@@ -2072,7 +2073,7 @@
           <a:p>
             <a:fld id="{834513E8-165F-4932-9E2D-FD497CB9A4FD}" type="datetimeFigureOut">
               <a:rPr lang="en-US" smtClean="0"/>
-              <a:t>7/23/2018</a:t>
+              <a:t>7/31/2018</a:t>
             </a:fld>
             <a:endParaRPr lang="en-US"/>
           </a:p>
@@ -2252,7 +2253,7 @@
           <a:p>
             <a:fld id="{834513E8-165F-4932-9E2D-FD497CB9A4FD}" type="datetimeFigureOut">
               <a:rPr lang="en-US" smtClean="0"/>
-              <a:t>7/23/2018</a:t>
+              <a:t>7/31/2018</a:t>
             </a:fld>
             <a:endParaRPr lang="en-US"/>
           </a:p>
@@ -2996,7 +2997,7 @@
           <a:p>
             <a:fld id="{834513E8-165F-4932-9E2D-FD497CB9A4FD}" type="datetimeFigureOut">
               <a:rPr lang="en-US" smtClean="0"/>
-              <a:t>7/23/2018</a:t>
+              <a:t>7/31/2018</a:t>
             </a:fld>
             <a:endParaRPr lang="en-US"/>
           </a:p>
@@ -3166,7 +3167,7 @@
           <a:p>
             <a:fld id="{834513E8-165F-4932-9E2D-FD497CB9A4FD}" type="datetimeFigureOut">
               <a:rPr lang="en-US" smtClean="0"/>
-              <a:t>7/23/2018</a:t>
+              <a:t>7/31/2018</a:t>
             </a:fld>
             <a:endParaRPr lang="en-US"/>
           </a:p>
@@ -3412,7 +3413,7 @@
           <a:p>
             <a:fld id="{834513E8-165F-4932-9E2D-FD497CB9A4FD}" type="datetimeFigureOut">
               <a:rPr lang="en-US" smtClean="0"/>
-              <a:t>7/23/2018</a:t>
+              <a:t>7/31/2018</a:t>
             </a:fld>
             <a:endParaRPr lang="en-US"/>
           </a:p>
@@ -3644,7 +3645,7 @@
           <a:p>
             <a:fld id="{834513E8-165F-4932-9E2D-FD497CB9A4FD}" type="datetimeFigureOut">
               <a:rPr lang="en-US" smtClean="0"/>
-              <a:t>7/23/2018</a:t>
+              <a:t>7/31/2018</a:t>
             </a:fld>
             <a:endParaRPr lang="en-US"/>
           </a:p>
@@ -4011,7 +4012,7 @@
           <a:p>
             <a:fld id="{834513E8-165F-4932-9E2D-FD497CB9A4FD}" type="datetimeFigureOut">
               <a:rPr lang="en-US" smtClean="0"/>
-              <a:t>7/23/2018</a:t>
+              <a:t>7/31/2018</a:t>
             </a:fld>
             <a:endParaRPr lang="en-US"/>
           </a:p>
@@ -4129,7 +4130,7 @@
           <a:p>
             <a:fld id="{834513E8-165F-4932-9E2D-FD497CB9A4FD}" type="datetimeFigureOut">
               <a:rPr lang="en-US" smtClean="0"/>
-              <a:t>7/23/2018</a:t>
+              <a:t>7/31/2018</a:t>
             </a:fld>
             <a:endParaRPr lang="en-US"/>
           </a:p>
@@ -5945,7 +5946,7 @@
           <a:p>
             <a:fld id="{834513E8-165F-4932-9E2D-FD497CB9A4FD}" type="datetimeFigureOut">
               <a:rPr lang="en-US" smtClean="0"/>
-              <a:t>7/23/2018</a:t>
+              <a:t>7/31/2018</a:t>
             </a:fld>
             <a:endParaRPr lang="en-US"/>
           </a:p>
@@ -8217,7 +8218,7 @@
         </p:nvSpPr>
         <p:spPr>
           <a:xfrm>
-            <a:off x="487266" y="1540975"/>
+            <a:off x="487266" y="1548858"/>
             <a:ext cx="7772400" cy="4724400"/>
           </a:xfrm>
         </p:spPr>
@@ -8617,7 +8618,7 @@
         <p:spPr bwMode="auto">
           <a:xfrm>
             <a:off x="4966137" y="2885090"/>
-            <a:ext cx="2435773" cy="1174531"/>
+            <a:ext cx="2435773" cy="1623848"/>
           </a:xfrm>
           <a:prstGeom prst="leftArrow">
             <a:avLst/>
@@ -8671,8 +8672,31 @@
                 <a:effectLst/>
                 <a:latin typeface="Arial" charset="0"/>
               </a:rPr>
-              <a:t>Remember when we talked about timing?</a:t>
-            </a:r>
+              <a:t>Remember when we talked about </a:t>
+            </a:r>
+            <a:r>
+              <a:rPr kumimoji="0" lang="en-US" sz="1600" b="0" i="0" u="none" strike="noStrike" cap="none" normalizeH="0" baseline="0" dirty="0" smtClean="0">
+                <a:ln>
+                  <a:noFill/>
+                </a:ln>
+                <a:solidFill>
+                  <a:schemeClr val="tx1"/>
+                </a:solidFill>
+                <a:effectLst/>
+                <a:latin typeface="Arial" charset="0"/>
+              </a:rPr>
+              <a:t>clock cycles?</a:t>
+            </a:r>
+            <a:endParaRPr kumimoji="0" lang="en-US" sz="1600" b="0" i="0" u="none" strike="noStrike" cap="none" normalizeH="0" baseline="0" dirty="0" smtClean="0">
+              <a:ln>
+                <a:noFill/>
+              </a:ln>
+              <a:solidFill>
+                <a:schemeClr val="tx1"/>
+              </a:solidFill>
+              <a:effectLst/>
+              <a:latin typeface="Arial" charset="0"/>
+            </a:endParaRPr>
           </a:p>
         </p:txBody>
       </p:sp>
@@ -9836,6 +9860,71 @@
           </a:extLst>
         </p:spPr>
       </p:pic>
+      <p:sp>
+        <p:nvSpPr>
+          <p:cNvPr id="5" name="Right Arrow 4"/>
+          <p:cNvSpPr/>
+          <p:nvPr/>
+        </p:nvSpPr>
+        <p:spPr bwMode="auto">
+          <a:xfrm>
+            <a:off x="1064172" y="5163207"/>
+            <a:ext cx="953814" cy="402021"/>
+          </a:xfrm>
+          <a:prstGeom prst="rightArrow">
+            <a:avLst/>
+          </a:prstGeom>
+          <a:solidFill>
+            <a:srgbClr val="00B050"/>
+          </a:solidFill>
+          <a:ln w="12700" cap="flat" cmpd="sng" algn="ctr">
+            <a:solidFill>
+              <a:schemeClr val="tx1"/>
+            </a:solidFill>
+            <a:prstDash val="solid"/>
+            <a:round/>
+            <a:headEnd type="none" w="med" len="med"/>
+            <a:tailEnd type="none" w="med" len="med"/>
+          </a:ln>
+          <a:effectLst/>
+        </p:spPr>
+        <p:txBody>
+          <a:bodyPr vert="horz" wrap="square" lIns="91440" tIns="45720" rIns="91440" bIns="45720" numCol="1" rtlCol="0" anchor="t" anchorCtr="0" compatLnSpc="1">
+            <a:prstTxWarp prst="textNoShape">
+              <a:avLst/>
+            </a:prstTxWarp>
+          </a:bodyPr>
+          <a:lstStyle/>
+          <a:p>
+            <a:pPr marL="0" marR="0" indent="0" algn="ctr" defTabSz="914400" rtl="0" eaLnBrk="0" fontAlgn="base" latinLnBrk="0" hangingPunct="0">
+              <a:lnSpc>
+                <a:spcPct val="100000"/>
+              </a:lnSpc>
+              <a:spcBef>
+                <a:spcPct val="0"/>
+              </a:spcBef>
+              <a:spcAft>
+                <a:spcPct val="0"/>
+              </a:spcAft>
+              <a:buClrTx/>
+              <a:buSzTx/>
+              <a:buFontTx/>
+              <a:buNone/>
+              <a:tabLst/>
+            </a:pPr>
+            <a:endParaRPr kumimoji="0" lang="en-US" sz="1600" b="0" i="0" u="none" strike="noStrike" cap="none" normalizeH="0" baseline="0" smtClean="0">
+              <a:ln>
+                <a:noFill/>
+              </a:ln>
+              <a:solidFill>
+                <a:schemeClr val="tx1"/>
+              </a:solidFill>
+              <a:effectLst/>
+              <a:latin typeface="Arial" charset="0"/>
+            </a:endParaRPr>
+          </a:p>
+        </p:txBody>
+      </p:sp>
     </p:spTree>
     <p:extLst>
       <p:ext uri="{BB962C8B-B14F-4D97-AF65-F5344CB8AC3E}">
@@ -9857,6 +9946,192 @@
 </file>
 
 <file path=ppt/slides/slide16.xml><?xml version="1.0" encoding="utf-8"?>
+<p:sld xmlns:a="http://schemas.openxmlformats.org/drawingml/2006/main" xmlns:r="http://schemas.openxmlformats.org/officeDocument/2006/relationships" xmlns:p="http://schemas.openxmlformats.org/presentationml/2006/main">
+  <p:cSld>
+    <p:spTree>
+      <p:nvGrpSpPr>
+        <p:cNvPr id="1" name=""/>
+        <p:cNvGrpSpPr/>
+        <p:nvPr/>
+      </p:nvGrpSpPr>
+      <p:grpSpPr>
+        <a:xfrm>
+          <a:off x="0" y="0"/>
+          <a:ext cx="0" cy="0"/>
+          <a:chOff x="0" y="0"/>
+          <a:chExt cx="0" cy="0"/>
+        </a:xfrm>
+      </p:grpSpPr>
+      <p:sp>
+        <p:nvSpPr>
+          <p:cNvPr id="2" name="Title 1"/>
+          <p:cNvSpPr>
+            <a:spLocks noGrp="1"/>
+          </p:cNvSpPr>
+          <p:nvPr>
+            <p:ph type="title"/>
+          </p:nvPr>
+        </p:nvSpPr>
+        <p:spPr/>
+        <p:txBody>
+          <a:bodyPr/>
+          <a:lstStyle/>
+          <a:p>
+            <a:r>
+              <a:rPr lang="en-US" dirty="0" smtClean="0"/>
+              <a:t>Calibrate DCO</a:t>
+            </a:r>
+            <a:endParaRPr lang="en-US" dirty="0"/>
+          </a:p>
+        </p:txBody>
+      </p:sp>
+      <p:sp>
+        <p:nvSpPr>
+          <p:cNvPr id="3" name="Content Placeholder 2"/>
+          <p:cNvSpPr>
+            <a:spLocks noGrp="1"/>
+          </p:cNvSpPr>
+          <p:nvPr>
+            <p:ph idx="1"/>
+          </p:nvPr>
+        </p:nvSpPr>
+        <p:spPr/>
+        <p:txBody>
+          <a:bodyPr/>
+          <a:lstStyle/>
+          <a:p>
+            <a:r>
+              <a:rPr lang="en-US" dirty="0" smtClean="0"/>
+              <a:t>Use </a:t>
+            </a:r>
+            <a:r>
+              <a:rPr lang="en-US" dirty="0" smtClean="0">
+                <a:solidFill>
+                  <a:srgbClr val="0070C0"/>
+                </a:solidFill>
+              </a:rPr>
+              <a:t>clock.asm</a:t>
+            </a:r>
+            <a:r>
+              <a:rPr lang="en-US" dirty="0" smtClean="0"/>
+              <a:t> to send the SMCLK to pin P1.4 and measure it with the logic analyzer</a:t>
+            </a:r>
+          </a:p>
+          <a:p>
+            <a:endParaRPr lang="en-US" dirty="0" smtClean="0"/>
+          </a:p>
+          <a:p>
+            <a:pPr marL="0" indent="0">
+              <a:buNone/>
+            </a:pPr>
+            <a:r>
+              <a:rPr lang="en-US" sz="1800" dirty="0">
+                <a:solidFill>
+                  <a:srgbClr val="00B050"/>
+                </a:solidFill>
+              </a:rPr>
+              <a:t>;-------------------------------------------------------------------------------</a:t>
+            </a:r>
+          </a:p>
+          <a:p>
+            <a:pPr marL="0" indent="0">
+              <a:buNone/>
+            </a:pPr>
+            <a:r>
+              <a:rPr lang="en-US" sz="1800" dirty="0">
+                <a:solidFill>
+                  <a:srgbClr val="00B050"/>
+                </a:solidFill>
+              </a:rPr>
+              <a:t>; Main loop here</a:t>
+            </a:r>
+          </a:p>
+          <a:p>
+            <a:pPr marL="0" indent="0">
+              <a:buNone/>
+            </a:pPr>
+            <a:r>
+              <a:rPr lang="en-US" sz="1800" dirty="0">
+                <a:solidFill>
+                  <a:srgbClr val="00B050"/>
+                </a:solidFill>
+              </a:rPr>
+              <a:t>;-------------------------------------------------------------------------------</a:t>
+            </a:r>
+          </a:p>
+          <a:p>
+            <a:pPr marL="0" indent="0">
+              <a:buNone/>
+            </a:pPr>
+            <a:r>
+              <a:rPr lang="en-US" sz="1800" dirty="0"/>
+              <a:t>            </a:t>
+            </a:r>
+            <a:r>
+              <a:rPr lang="en-US" sz="1800" dirty="0" err="1"/>
+              <a:t>bis.b</a:t>
+            </a:r>
+            <a:r>
+              <a:rPr lang="en-US" sz="1800" dirty="0"/>
+              <a:t> #BIT4, &amp;P1DIR ; show SMCLK on P1.4</a:t>
+            </a:r>
+          </a:p>
+          <a:p>
+            <a:pPr marL="0" indent="0">
+              <a:buNone/>
+            </a:pPr>
+            <a:r>
+              <a:rPr lang="en-US" sz="1800" dirty="0"/>
+              <a:t>            </a:t>
+            </a:r>
+            <a:r>
+              <a:rPr lang="en-US" sz="1800" dirty="0" err="1"/>
+              <a:t>bis.b</a:t>
+            </a:r>
+            <a:r>
+              <a:rPr lang="en-US" sz="1800" dirty="0"/>
+              <a:t> #BIT4, &amp;P1SEL</a:t>
+            </a:r>
+          </a:p>
+          <a:p>
+            <a:pPr marL="0" indent="0">
+              <a:buNone/>
+            </a:pPr>
+            <a:endParaRPr lang="en-US" sz="1800" dirty="0" smtClean="0"/>
+          </a:p>
+          <a:p>
+            <a:pPr marL="0" indent="0">
+              <a:buNone/>
+            </a:pPr>
+            <a:r>
+              <a:rPr lang="en-US" sz="1800" dirty="0" smtClean="0"/>
+              <a:t>forever     </a:t>
+            </a:r>
+            <a:r>
+              <a:rPr lang="en-US" sz="1800" dirty="0" err="1"/>
+              <a:t>jmp</a:t>
+            </a:r>
+            <a:r>
+              <a:rPr lang="en-US" sz="1800" dirty="0"/>
+              <a:t> forever</a:t>
+            </a:r>
+          </a:p>
+        </p:txBody>
+      </p:sp>
+    </p:spTree>
+    <p:extLst>
+      <p:ext uri="{BB962C8B-B14F-4D97-AF65-F5344CB8AC3E}">
+        <p14:creationId xmlns:p14="http://schemas.microsoft.com/office/powerpoint/2010/main" val="3322171891"/>
+      </p:ext>
+    </p:extLst>
+  </p:cSld>
+  <p:clrMapOvr>
+    <a:masterClrMapping/>
+  </p:clrMapOvr>
+</p:sld>
+</file>
+
+<file path=ppt/slides/slide17.xml><?xml version="1.0" encoding="utf-8"?>
 <p:sld xmlns:a="http://schemas.openxmlformats.org/drawingml/2006/main" xmlns:r="http://schemas.openxmlformats.org/officeDocument/2006/relationships" xmlns:p="http://schemas.openxmlformats.org/presentationml/2006/main">
   <p:cSld>
     <p:spTree>
@@ -10469,8 +10744,8 @@
 </p:sld>
 </file>
 
-<file path=ppt/slides/slide17.xml><?xml version="1.0" encoding="utf-8"?>
-<p:sld xmlns:a="http://schemas.openxmlformats.org/drawingml/2006/main" xmlns:r="http://schemas.openxmlformats.org/officeDocument/2006/relationships" xmlns:p="http://schemas.openxmlformats.org/presentationml/2006/main">
+<file path=ppt/slides/slide18.xml><?xml version="1.0" encoding="utf-8"?>
+<p:sld xmlns:a="http://schemas.openxmlformats.org/drawingml/2006/main" xmlns:r="http://schemas.openxmlformats.org/officeDocument/2006/relationships" xmlns:p="http://schemas.openxmlformats.org/presentationml/2006/main" show="0">
   <p:cSld>
     <p:spTree>
       <p:nvGrpSpPr>
@@ -10809,1130 +11084,7 @@
   <p:clrMapOvr>
     <a:masterClrMapping/>
   </p:clrMapOvr>
-  <p:timing>
-    <p:tnLst>
-      <p:par>
-        <p:cTn id="1" dur="indefinite" restart="never" nodeType="tmRoot"/>
-      </p:par>
-    </p:tnLst>
-  </p:timing>
-</p:sld>
-</file>
-
-<file path=ppt/slides/slide18.xml><?xml version="1.0" encoding="utf-8"?>
-<p:sld xmlns:a="http://schemas.openxmlformats.org/drawingml/2006/main" xmlns:r="http://schemas.openxmlformats.org/officeDocument/2006/relationships" xmlns:p="http://schemas.openxmlformats.org/presentationml/2006/main">
-  <p:cSld>
-    <p:spTree>
-      <p:nvGrpSpPr>
-        <p:cNvPr id="1" name=""/>
-        <p:cNvGrpSpPr/>
-        <p:nvPr/>
-      </p:nvGrpSpPr>
-      <p:grpSpPr>
-        <a:xfrm>
-          <a:off x="0" y="0"/>
-          <a:ext cx="0" cy="0"/>
-          <a:chOff x="0" y="0"/>
-          <a:chExt cx="0" cy="0"/>
-        </a:xfrm>
-      </p:grpSpPr>
-      <p:sp>
-        <p:nvSpPr>
-          <p:cNvPr id="2" name="Title 1"/>
-          <p:cNvSpPr>
-            <a:spLocks noGrp="1"/>
-          </p:cNvSpPr>
-          <p:nvPr>
-            <p:ph type="title"/>
-          </p:nvPr>
-        </p:nvSpPr>
-        <p:spPr/>
-        <p:txBody>
-          <a:bodyPr/>
-          <a:lstStyle/>
-          <a:p>
-            <a:r>
-              <a:rPr lang="en-US" dirty="0" err="1" smtClean="0"/>
-              <a:t>Debounced</a:t>
-            </a:r>
-            <a:r>
-              <a:rPr lang="en-US" dirty="0" smtClean="0"/>
-              <a:t> code with SW delay</a:t>
-            </a:r>
-            <a:endParaRPr lang="en-US" dirty="0"/>
-          </a:p>
-        </p:txBody>
-      </p:sp>
-      <p:sp>
-        <p:nvSpPr>
-          <p:cNvPr id="3" name="Content Placeholder 2"/>
-          <p:cNvSpPr>
-            <a:spLocks noGrp="1"/>
-          </p:cNvSpPr>
-          <p:nvPr>
-            <p:ph idx="1"/>
-          </p:nvPr>
-        </p:nvSpPr>
-        <p:spPr>
-          <a:xfrm>
-            <a:off x="723958" y="1551299"/>
-            <a:ext cx="7772400" cy="4724400"/>
-          </a:xfrm>
-        </p:spPr>
-        <p:txBody>
-          <a:bodyPr>
-            <a:normAutofit fontScale="92500" lnSpcReduction="20000"/>
-          </a:bodyPr>
-          <a:lstStyle/>
-          <a:p>
-            <a:pPr marL="0" indent="0">
-              <a:buNone/>
-            </a:pPr>
-            <a:r>
-              <a:rPr lang="en-US" sz="1400" b="1" dirty="0">
-                <a:solidFill>
-                  <a:schemeClr val="accent2"/>
-                </a:solidFill>
-                <a:latin typeface="Courier New" pitchFamily="49" charset="0"/>
-                <a:cs typeface="Courier New" pitchFamily="49" charset="0"/>
-              </a:rPr>
-              <a:t>		</a:t>
-            </a:r>
-            <a:r>
-              <a:rPr lang="en-US" sz="1400" b="1" dirty="0" smtClean="0">
-                <a:solidFill>
-                  <a:schemeClr val="accent2"/>
-                </a:solidFill>
-                <a:latin typeface="Courier New" pitchFamily="49" charset="0"/>
-                <a:cs typeface="Courier New" pitchFamily="49" charset="0"/>
-              </a:rPr>
-              <a:t>    </a:t>
-            </a:r>
-            <a:r>
-              <a:rPr lang="en-US" sz="1400" b="1" dirty="0" smtClean="0">
-                <a:solidFill>
-                  <a:srgbClr val="00B050"/>
-                </a:solidFill>
-                <a:latin typeface="Courier New" pitchFamily="49" charset="0"/>
-                <a:cs typeface="Courier New" pitchFamily="49" charset="0"/>
-              </a:rPr>
-              <a:t>; </a:t>
-            </a:r>
-            <a:r>
-              <a:rPr lang="en-US" sz="1400" b="1" dirty="0">
-                <a:solidFill>
-                  <a:srgbClr val="00B050"/>
-                </a:solidFill>
-                <a:latin typeface="Courier New" pitchFamily="49" charset="0"/>
-                <a:cs typeface="Courier New" pitchFamily="49" charset="0"/>
-              </a:rPr>
-              <a:t>Setup P1.3 for button input</a:t>
-            </a:r>
-          </a:p>
-          <a:p>
-            <a:pPr marL="0" indent="0">
-              <a:buNone/>
-            </a:pPr>
-            <a:r>
-              <a:rPr lang="en-US" sz="1400" b="1" dirty="0">
-                <a:solidFill>
-                  <a:schemeClr val="accent2"/>
-                </a:solidFill>
-                <a:latin typeface="Courier New" pitchFamily="49" charset="0"/>
-                <a:cs typeface="Courier New" pitchFamily="49" charset="0"/>
-              </a:rPr>
-              <a:t>                     </a:t>
-            </a:r>
-            <a:r>
-              <a:rPr lang="en-US" sz="1400" b="1" dirty="0" err="1">
-                <a:solidFill>
-                  <a:schemeClr val="accent2"/>
-                </a:solidFill>
-                <a:latin typeface="Courier New" pitchFamily="49" charset="0"/>
-                <a:cs typeface="Courier New" pitchFamily="49" charset="0"/>
-              </a:rPr>
-              <a:t>bis.b</a:t>
-            </a:r>
-            <a:r>
-              <a:rPr lang="en-US" sz="1400" b="1" dirty="0">
-                <a:solidFill>
-                  <a:schemeClr val="accent2"/>
-                </a:solidFill>
-                <a:latin typeface="Courier New" pitchFamily="49" charset="0"/>
-                <a:cs typeface="Courier New" pitchFamily="49" charset="0"/>
-              </a:rPr>
-              <a:t>  #BIT3, &amp;P1OUT</a:t>
-            </a:r>
-          </a:p>
-          <a:p>
-            <a:pPr marL="0" indent="0">
-              <a:buNone/>
-            </a:pPr>
-            <a:r>
-              <a:rPr lang="en-US" sz="1400" b="1" dirty="0">
-                <a:solidFill>
-                  <a:schemeClr val="accent2"/>
-                </a:solidFill>
-                <a:latin typeface="Courier New" pitchFamily="49" charset="0"/>
-                <a:cs typeface="Courier New" pitchFamily="49" charset="0"/>
-              </a:rPr>
-              <a:t>                     </a:t>
-            </a:r>
-            <a:r>
-              <a:rPr lang="en-US" sz="1400" b="1" dirty="0" err="1">
-                <a:solidFill>
-                  <a:schemeClr val="accent2"/>
-                </a:solidFill>
-                <a:latin typeface="Courier New" pitchFamily="49" charset="0"/>
-                <a:cs typeface="Courier New" pitchFamily="49" charset="0"/>
-              </a:rPr>
-              <a:t>bis.b</a:t>
-            </a:r>
-            <a:r>
-              <a:rPr lang="en-US" sz="1400" b="1" dirty="0">
-                <a:solidFill>
-                  <a:schemeClr val="accent2"/>
-                </a:solidFill>
-                <a:latin typeface="Courier New" pitchFamily="49" charset="0"/>
-                <a:cs typeface="Courier New" pitchFamily="49" charset="0"/>
-              </a:rPr>
-              <a:t>  #BIT3, &amp;P1REN</a:t>
-            </a:r>
-          </a:p>
-          <a:p>
-            <a:pPr marL="0" indent="0">
-              <a:buNone/>
-            </a:pPr>
-            <a:r>
-              <a:rPr lang="en-US" sz="1400" b="1" dirty="0">
-                <a:solidFill>
-                  <a:schemeClr val="accent2"/>
-                </a:solidFill>
-                <a:latin typeface="Courier New" pitchFamily="49" charset="0"/>
-                <a:cs typeface="Courier New" pitchFamily="49" charset="0"/>
-              </a:rPr>
-              <a:t>                     </a:t>
-            </a:r>
-            <a:r>
-              <a:rPr lang="en-US" sz="1400" b="1" dirty="0" err="1">
-                <a:solidFill>
-                  <a:schemeClr val="accent2"/>
-                </a:solidFill>
-                <a:latin typeface="Courier New" pitchFamily="49" charset="0"/>
-                <a:cs typeface="Courier New" pitchFamily="49" charset="0"/>
-              </a:rPr>
-              <a:t>bic.b</a:t>
-            </a:r>
-            <a:r>
-              <a:rPr lang="en-US" sz="1400" b="1" dirty="0">
-                <a:solidFill>
-                  <a:schemeClr val="accent2"/>
-                </a:solidFill>
-                <a:latin typeface="Courier New" pitchFamily="49" charset="0"/>
-                <a:cs typeface="Courier New" pitchFamily="49" charset="0"/>
-              </a:rPr>
-              <a:t>  #BIT3, &amp;P1DIR</a:t>
-            </a:r>
-          </a:p>
-          <a:p>
-            <a:pPr marL="0" indent="0">
-              <a:buNone/>
-            </a:pPr>
-            <a:endParaRPr lang="en-US" sz="1400" b="1" dirty="0">
-              <a:solidFill>
-                <a:schemeClr val="accent2"/>
-              </a:solidFill>
-              <a:latin typeface="Courier New" pitchFamily="49" charset="0"/>
-              <a:cs typeface="Courier New" pitchFamily="49" charset="0"/>
-            </a:endParaRPr>
-          </a:p>
-          <a:p>
-            <a:pPr marL="0" indent="0">
-              <a:buNone/>
-            </a:pPr>
-            <a:r>
-              <a:rPr lang="en-US" sz="1400" b="1" dirty="0">
-                <a:solidFill>
-                  <a:schemeClr val="accent2"/>
-                </a:solidFill>
-                <a:latin typeface="Courier New" pitchFamily="49" charset="0"/>
-                <a:cs typeface="Courier New" pitchFamily="49" charset="0"/>
-              </a:rPr>
-              <a:t>                     </a:t>
-            </a:r>
-            <a:r>
-              <a:rPr lang="en-US" sz="1400" b="1" dirty="0" err="1">
-                <a:solidFill>
-                  <a:schemeClr val="accent2"/>
-                </a:solidFill>
-                <a:latin typeface="Courier New" pitchFamily="49" charset="0"/>
-                <a:cs typeface="Courier New" pitchFamily="49" charset="0"/>
-              </a:rPr>
-              <a:t>clr</a:t>
-            </a:r>
-            <a:r>
-              <a:rPr lang="en-US" sz="1400" b="1" dirty="0">
-                <a:solidFill>
-                  <a:schemeClr val="accent2"/>
-                </a:solidFill>
-                <a:latin typeface="Courier New" pitchFamily="49" charset="0"/>
-                <a:cs typeface="Courier New" pitchFamily="49" charset="0"/>
-              </a:rPr>
-              <a:t> </a:t>
-            </a:r>
-            <a:r>
-              <a:rPr lang="en-US" sz="1400" b="1" dirty="0" smtClean="0">
-                <a:solidFill>
-                  <a:schemeClr val="accent2"/>
-                </a:solidFill>
-                <a:latin typeface="Courier New" pitchFamily="49" charset="0"/>
-                <a:cs typeface="Courier New" pitchFamily="49" charset="0"/>
-              </a:rPr>
-              <a:t>R4</a:t>
-            </a:r>
-            <a:r>
-              <a:rPr lang="en-US" sz="1400" dirty="0">
-                <a:solidFill>
-                  <a:schemeClr val="accent2"/>
-                </a:solidFill>
-                <a:latin typeface="Courier New" pitchFamily="49" charset="0"/>
-                <a:cs typeface="Courier New" pitchFamily="49" charset="0"/>
-              </a:rPr>
-              <a:t> </a:t>
-            </a:r>
-            <a:r>
-              <a:rPr lang="en-US" sz="1400" b="1" dirty="0" smtClean="0">
-                <a:solidFill>
-                  <a:srgbClr val="00B050"/>
-                </a:solidFill>
-                <a:latin typeface="Courier New" pitchFamily="49" charset="0"/>
-                <a:cs typeface="Courier New" pitchFamily="49" charset="0"/>
-              </a:rPr>
-              <a:t>; Variable to hold the number </a:t>
-            </a:r>
-            <a:r>
-              <a:rPr lang="en-US" sz="1400" dirty="0" smtClean="0">
-                <a:solidFill>
-                  <a:srgbClr val="00B050"/>
-                </a:solidFill>
-                <a:latin typeface="Courier New" pitchFamily="49" charset="0"/>
-                <a:cs typeface="Courier New" pitchFamily="49" charset="0"/>
-              </a:rPr>
-              <a:t> </a:t>
-            </a:r>
-            <a:r>
-              <a:rPr lang="en-US" sz="1400" b="1" dirty="0" smtClean="0">
-                <a:solidFill>
-                  <a:srgbClr val="00B050"/>
-                </a:solidFill>
-                <a:latin typeface="Courier New" pitchFamily="49" charset="0"/>
-                <a:cs typeface="Courier New" pitchFamily="49" charset="0"/>
-              </a:rPr>
-              <a:t>of button pushes</a:t>
-            </a:r>
-            <a:endParaRPr lang="en-US" sz="1400" b="1" dirty="0">
-              <a:solidFill>
-                <a:srgbClr val="00B050"/>
-              </a:solidFill>
-              <a:latin typeface="Courier New" pitchFamily="49" charset="0"/>
-              <a:cs typeface="Courier New" pitchFamily="49" charset="0"/>
-            </a:endParaRPr>
-          </a:p>
-          <a:p>
-            <a:pPr marL="0" indent="0">
-              <a:buNone/>
-            </a:pPr>
-            <a:endParaRPr lang="en-US" sz="1400" b="1" dirty="0">
-              <a:solidFill>
-                <a:schemeClr val="accent2"/>
-              </a:solidFill>
-              <a:latin typeface="Courier New" pitchFamily="49" charset="0"/>
-              <a:cs typeface="Courier New" pitchFamily="49" charset="0"/>
-            </a:endParaRPr>
-          </a:p>
-          <a:p>
-            <a:pPr marL="0" indent="0">
-              <a:buNone/>
-            </a:pPr>
-            <a:r>
-              <a:rPr lang="en-US" sz="1400" b="1" dirty="0">
-                <a:solidFill>
-                  <a:srgbClr val="00B050"/>
-                </a:solidFill>
-                <a:latin typeface="Courier New" pitchFamily="49" charset="0"/>
-                <a:cs typeface="Courier New" pitchFamily="49" charset="0"/>
-              </a:rPr>
-              <a:t>; Increment </a:t>
-            </a:r>
-            <a:r>
-              <a:rPr lang="en-US" sz="1400" b="1" dirty="0" err="1">
-                <a:solidFill>
-                  <a:srgbClr val="00B050"/>
-                </a:solidFill>
-                <a:latin typeface="Courier New" pitchFamily="49" charset="0"/>
-                <a:cs typeface="Courier New" pitchFamily="49" charset="0"/>
-              </a:rPr>
-              <a:t>Btn</a:t>
-            </a:r>
-            <a:r>
-              <a:rPr lang="en-US" sz="1400" b="1" dirty="0">
-                <a:solidFill>
-                  <a:srgbClr val="00B050"/>
-                </a:solidFill>
-                <a:latin typeface="Courier New" pitchFamily="49" charset="0"/>
-                <a:cs typeface="Courier New" pitchFamily="49" charset="0"/>
-              </a:rPr>
-              <a:t> Counter on </a:t>
-            </a:r>
-            <a:r>
-              <a:rPr lang="en-US" sz="1400" b="1" dirty="0" err="1">
-                <a:solidFill>
-                  <a:srgbClr val="00B050"/>
-                </a:solidFill>
-                <a:latin typeface="Courier New" pitchFamily="49" charset="0"/>
-                <a:cs typeface="Courier New" pitchFamily="49" charset="0"/>
-              </a:rPr>
-              <a:t>Btn</a:t>
-            </a:r>
-            <a:r>
-              <a:rPr lang="en-US" sz="1400" b="1" dirty="0">
-                <a:solidFill>
-                  <a:srgbClr val="00B050"/>
-                </a:solidFill>
-                <a:latin typeface="Courier New" pitchFamily="49" charset="0"/>
-                <a:cs typeface="Courier New" pitchFamily="49" charset="0"/>
-              </a:rPr>
-              <a:t> press</a:t>
-            </a:r>
-          </a:p>
-          <a:p>
-            <a:pPr marL="0" indent="0">
-              <a:buNone/>
-            </a:pPr>
-            <a:r>
-              <a:rPr lang="en-US" sz="1400" b="1" dirty="0">
-                <a:solidFill>
-                  <a:srgbClr val="00B050"/>
-                </a:solidFill>
-                <a:latin typeface="Courier New" pitchFamily="49" charset="0"/>
-                <a:cs typeface="Courier New" pitchFamily="49" charset="0"/>
-              </a:rPr>
-              <a:t>; A delay is used immediately after the press and release</a:t>
-            </a:r>
-          </a:p>
-          <a:p>
-            <a:pPr marL="0" indent="0">
-              <a:buNone/>
-            </a:pPr>
-            <a:r>
-              <a:rPr lang="en-US" sz="1400" b="1" dirty="0" err="1">
-                <a:solidFill>
-                  <a:schemeClr val="accent2"/>
-                </a:solidFill>
-                <a:latin typeface="Courier New" pitchFamily="49" charset="0"/>
-                <a:cs typeface="Courier New" pitchFamily="49" charset="0"/>
-              </a:rPr>
-              <a:t>check_btn</a:t>
-            </a:r>
-            <a:r>
-              <a:rPr lang="en-US" sz="1400" b="1" dirty="0">
-                <a:solidFill>
-                  <a:schemeClr val="accent2"/>
-                </a:solidFill>
-                <a:latin typeface="Courier New" pitchFamily="49" charset="0"/>
-                <a:cs typeface="Courier New" pitchFamily="49" charset="0"/>
-              </a:rPr>
-              <a:t>:           </a:t>
-            </a:r>
-            <a:r>
-              <a:rPr lang="en-US" sz="1400" b="1" dirty="0" err="1">
-                <a:solidFill>
-                  <a:schemeClr val="accent2"/>
-                </a:solidFill>
-                <a:latin typeface="Courier New" pitchFamily="49" charset="0"/>
-                <a:cs typeface="Courier New" pitchFamily="49" charset="0"/>
-              </a:rPr>
-              <a:t>bit.b</a:t>
-            </a:r>
-            <a:r>
-              <a:rPr lang="en-US" sz="1400" b="1" dirty="0">
-                <a:solidFill>
-                  <a:schemeClr val="accent2"/>
-                </a:solidFill>
-                <a:latin typeface="Courier New" pitchFamily="49" charset="0"/>
-                <a:cs typeface="Courier New" pitchFamily="49" charset="0"/>
-              </a:rPr>
-              <a:t>  #BIT3, &amp;P1IN</a:t>
-            </a:r>
-          </a:p>
-          <a:p>
-            <a:pPr marL="0" indent="0">
-              <a:buNone/>
-            </a:pPr>
-            <a:r>
-              <a:rPr lang="en-US" sz="1400" b="1" dirty="0">
-                <a:solidFill>
-                  <a:schemeClr val="accent2"/>
-                </a:solidFill>
-                <a:latin typeface="Courier New" pitchFamily="49" charset="0"/>
-                <a:cs typeface="Courier New" pitchFamily="49" charset="0"/>
-              </a:rPr>
-              <a:t>                     </a:t>
-            </a:r>
-            <a:r>
-              <a:rPr lang="en-US" sz="1400" b="1" dirty="0" err="1">
-                <a:solidFill>
-                  <a:schemeClr val="accent2"/>
-                </a:solidFill>
-                <a:latin typeface="Courier New" pitchFamily="49" charset="0"/>
-                <a:cs typeface="Courier New" pitchFamily="49" charset="0"/>
-              </a:rPr>
-              <a:t>jnz</a:t>
-            </a:r>
-            <a:r>
-              <a:rPr lang="en-US" sz="1400" b="1" dirty="0">
-                <a:solidFill>
-                  <a:schemeClr val="accent2"/>
-                </a:solidFill>
-                <a:latin typeface="Courier New" pitchFamily="49" charset="0"/>
-                <a:cs typeface="Courier New" pitchFamily="49" charset="0"/>
-              </a:rPr>
-              <a:t>    </a:t>
-            </a:r>
-            <a:r>
-              <a:rPr lang="en-US" sz="1400" b="1" dirty="0" err="1">
-                <a:solidFill>
-                  <a:schemeClr val="accent2"/>
-                </a:solidFill>
-                <a:latin typeface="Courier New" pitchFamily="49" charset="0"/>
-                <a:cs typeface="Courier New" pitchFamily="49" charset="0"/>
-              </a:rPr>
-              <a:t>check_btn</a:t>
-            </a:r>
-            <a:endParaRPr lang="en-US" sz="1400" b="1" dirty="0">
-              <a:solidFill>
-                <a:schemeClr val="accent2"/>
-              </a:solidFill>
-              <a:latin typeface="Courier New" pitchFamily="49" charset="0"/>
-              <a:cs typeface="Courier New" pitchFamily="49" charset="0"/>
-            </a:endParaRPr>
-          </a:p>
-          <a:p>
-            <a:pPr marL="0" indent="0">
-              <a:buNone/>
-            </a:pPr>
-            <a:endParaRPr lang="en-US" sz="1400" b="1" dirty="0">
-              <a:solidFill>
-                <a:schemeClr val="accent2"/>
-              </a:solidFill>
-              <a:latin typeface="Courier New" pitchFamily="49" charset="0"/>
-              <a:cs typeface="Courier New" pitchFamily="49" charset="0"/>
-            </a:endParaRPr>
-          </a:p>
-          <a:p>
-            <a:pPr marL="0" indent="0">
-              <a:buNone/>
-            </a:pPr>
-            <a:r>
-              <a:rPr lang="en-US" sz="1400" b="1" dirty="0">
-                <a:solidFill>
-                  <a:schemeClr val="accent2"/>
-                </a:solidFill>
-                <a:latin typeface="Courier New" pitchFamily="49" charset="0"/>
-                <a:cs typeface="Courier New" pitchFamily="49" charset="0"/>
-              </a:rPr>
-              <a:t>                     </a:t>
-            </a:r>
-            <a:r>
-              <a:rPr lang="en-US" sz="1400" b="1" dirty="0" err="1">
-                <a:solidFill>
-                  <a:schemeClr val="accent2"/>
-                </a:solidFill>
-                <a:latin typeface="Courier New" pitchFamily="49" charset="0"/>
-                <a:cs typeface="Courier New" pitchFamily="49" charset="0"/>
-              </a:rPr>
-              <a:t>inc</a:t>
-            </a:r>
-            <a:r>
-              <a:rPr lang="en-US" sz="1400" b="1" dirty="0">
-                <a:solidFill>
-                  <a:schemeClr val="accent2"/>
-                </a:solidFill>
-                <a:latin typeface="Courier New" pitchFamily="49" charset="0"/>
-                <a:cs typeface="Courier New" pitchFamily="49" charset="0"/>
-              </a:rPr>
-              <a:t> R4</a:t>
-            </a:r>
-          </a:p>
-          <a:p>
-            <a:pPr marL="0" indent="0">
-              <a:buNone/>
-            </a:pPr>
-            <a:endParaRPr lang="en-US" sz="1400" b="1" dirty="0">
-              <a:solidFill>
-                <a:schemeClr val="accent2"/>
-              </a:solidFill>
-              <a:latin typeface="Courier New" pitchFamily="49" charset="0"/>
-              <a:cs typeface="Courier New" pitchFamily="49" charset="0"/>
-            </a:endParaRPr>
-          </a:p>
-          <a:p>
-            <a:pPr marL="0" indent="0">
-              <a:buNone/>
-            </a:pPr>
-            <a:r>
-              <a:rPr lang="en-US" sz="1400" b="1" dirty="0">
-                <a:solidFill>
-                  <a:schemeClr val="accent2"/>
-                </a:solidFill>
-                <a:latin typeface="Courier New" pitchFamily="49" charset="0"/>
-                <a:cs typeface="Courier New" pitchFamily="49" charset="0"/>
-              </a:rPr>
-              <a:t>                     call   #</a:t>
-            </a:r>
-            <a:r>
-              <a:rPr lang="en-US" sz="1400" b="1" dirty="0" err="1">
-                <a:solidFill>
-                  <a:schemeClr val="accent2"/>
-                </a:solidFill>
-                <a:latin typeface="Courier New" pitchFamily="49" charset="0"/>
-                <a:cs typeface="Courier New" pitchFamily="49" charset="0"/>
-              </a:rPr>
-              <a:t>software_delay</a:t>
-            </a:r>
-            <a:endParaRPr lang="en-US" sz="1400" b="1" dirty="0">
-              <a:solidFill>
-                <a:schemeClr val="accent2"/>
-              </a:solidFill>
-              <a:latin typeface="Courier New" pitchFamily="49" charset="0"/>
-              <a:cs typeface="Courier New" pitchFamily="49" charset="0"/>
-            </a:endParaRPr>
-          </a:p>
-          <a:p>
-            <a:pPr marL="0" indent="0">
-              <a:buNone/>
-            </a:pPr>
-            <a:r>
-              <a:rPr lang="en-US" sz="1400" b="1" dirty="0">
-                <a:solidFill>
-                  <a:schemeClr val="accent2"/>
-                </a:solidFill>
-                <a:latin typeface="Courier New" pitchFamily="49" charset="0"/>
-                <a:cs typeface="Courier New" pitchFamily="49" charset="0"/>
-              </a:rPr>
-              <a:t>                     </a:t>
-            </a:r>
-            <a:r>
-              <a:rPr lang="en-US" sz="1400" b="1" dirty="0" err="1">
-                <a:solidFill>
-                  <a:schemeClr val="accent2"/>
-                </a:solidFill>
-                <a:latin typeface="Courier New" pitchFamily="49" charset="0"/>
-                <a:cs typeface="Courier New" pitchFamily="49" charset="0"/>
-              </a:rPr>
-              <a:t>jmp</a:t>
-            </a:r>
-            <a:r>
-              <a:rPr lang="en-US" sz="1400" b="1" dirty="0">
-                <a:solidFill>
-                  <a:schemeClr val="accent2"/>
-                </a:solidFill>
-                <a:latin typeface="Courier New" pitchFamily="49" charset="0"/>
-                <a:cs typeface="Courier New" pitchFamily="49" charset="0"/>
-              </a:rPr>
-              <a:t>    </a:t>
-            </a:r>
-            <a:r>
-              <a:rPr lang="en-US" sz="1400" b="1" dirty="0" err="1">
-                <a:solidFill>
-                  <a:schemeClr val="accent2"/>
-                </a:solidFill>
-                <a:latin typeface="Courier New" pitchFamily="49" charset="0"/>
-                <a:cs typeface="Courier New" pitchFamily="49" charset="0"/>
-              </a:rPr>
-              <a:t>btn_pushed</a:t>
-            </a:r>
-            <a:endParaRPr lang="en-US" sz="1400" b="1" dirty="0">
-              <a:solidFill>
-                <a:schemeClr val="accent2"/>
-              </a:solidFill>
-              <a:latin typeface="Courier New" pitchFamily="49" charset="0"/>
-              <a:cs typeface="Courier New" pitchFamily="49" charset="0"/>
-            </a:endParaRPr>
-          </a:p>
-          <a:p>
-            <a:pPr marL="0" indent="0">
-              <a:buNone/>
-            </a:pPr>
-            <a:endParaRPr lang="en-US" sz="1400" b="1" dirty="0">
-              <a:solidFill>
-                <a:schemeClr val="accent2"/>
-              </a:solidFill>
-              <a:latin typeface="Courier New" pitchFamily="49" charset="0"/>
-              <a:cs typeface="Courier New" pitchFamily="49" charset="0"/>
-            </a:endParaRPr>
-          </a:p>
-          <a:p>
-            <a:pPr marL="0" indent="0">
-              <a:buNone/>
-            </a:pPr>
-            <a:r>
-              <a:rPr lang="en-US" sz="1400" b="1" dirty="0" err="1">
-                <a:solidFill>
-                  <a:schemeClr val="accent2"/>
-                </a:solidFill>
-                <a:latin typeface="Courier New" pitchFamily="49" charset="0"/>
-                <a:cs typeface="Courier New" pitchFamily="49" charset="0"/>
-              </a:rPr>
-              <a:t>btn_pushed</a:t>
-            </a:r>
-            <a:r>
-              <a:rPr lang="en-US" sz="1400" b="1" dirty="0">
-                <a:solidFill>
-                  <a:schemeClr val="accent2"/>
-                </a:solidFill>
-                <a:latin typeface="Courier New" pitchFamily="49" charset="0"/>
-                <a:cs typeface="Courier New" pitchFamily="49" charset="0"/>
-              </a:rPr>
-              <a:t>:          </a:t>
-            </a:r>
-            <a:r>
-              <a:rPr lang="en-US" sz="1400" b="1" dirty="0" err="1">
-                <a:solidFill>
-                  <a:schemeClr val="accent2"/>
-                </a:solidFill>
-                <a:latin typeface="Courier New" pitchFamily="49" charset="0"/>
-                <a:cs typeface="Courier New" pitchFamily="49" charset="0"/>
-              </a:rPr>
-              <a:t>bit.b</a:t>
-            </a:r>
-            <a:r>
-              <a:rPr lang="en-US" sz="1400" b="1" dirty="0">
-                <a:solidFill>
-                  <a:schemeClr val="accent2"/>
-                </a:solidFill>
-                <a:latin typeface="Courier New" pitchFamily="49" charset="0"/>
-                <a:cs typeface="Courier New" pitchFamily="49" charset="0"/>
-              </a:rPr>
-              <a:t>  #BIT3, &amp;P1IN</a:t>
-            </a:r>
-          </a:p>
-          <a:p>
-            <a:pPr marL="0" indent="0">
-              <a:buNone/>
-            </a:pPr>
-            <a:r>
-              <a:rPr lang="en-US" sz="1400" b="1" dirty="0">
-                <a:solidFill>
-                  <a:schemeClr val="accent2"/>
-                </a:solidFill>
-                <a:latin typeface="Courier New" pitchFamily="49" charset="0"/>
-                <a:cs typeface="Courier New" pitchFamily="49" charset="0"/>
-              </a:rPr>
-              <a:t>                     </a:t>
-            </a:r>
-            <a:r>
-              <a:rPr lang="en-US" sz="1400" b="1" dirty="0" err="1">
-                <a:solidFill>
-                  <a:schemeClr val="accent2"/>
-                </a:solidFill>
-                <a:latin typeface="Courier New" pitchFamily="49" charset="0"/>
-                <a:cs typeface="Courier New" pitchFamily="49" charset="0"/>
-              </a:rPr>
-              <a:t>jz</a:t>
-            </a:r>
-            <a:r>
-              <a:rPr lang="en-US" sz="1400" b="1" dirty="0">
-                <a:solidFill>
-                  <a:schemeClr val="accent2"/>
-                </a:solidFill>
-                <a:latin typeface="Courier New" pitchFamily="49" charset="0"/>
-                <a:cs typeface="Courier New" pitchFamily="49" charset="0"/>
-              </a:rPr>
-              <a:t>     </a:t>
-            </a:r>
-            <a:r>
-              <a:rPr lang="en-US" sz="1400" b="1" dirty="0" err="1" smtClean="0">
-                <a:solidFill>
-                  <a:schemeClr val="accent2"/>
-                </a:solidFill>
-                <a:latin typeface="Courier New" pitchFamily="49" charset="0"/>
-                <a:cs typeface="Courier New" pitchFamily="49" charset="0"/>
-              </a:rPr>
-              <a:t>btn_pushed</a:t>
-            </a:r>
-            <a:endParaRPr lang="en-US" sz="1400" b="1" dirty="0" smtClean="0">
-              <a:solidFill>
-                <a:schemeClr val="accent2"/>
-              </a:solidFill>
-              <a:latin typeface="Courier New" pitchFamily="49" charset="0"/>
-              <a:cs typeface="Courier New" pitchFamily="49" charset="0"/>
-            </a:endParaRPr>
-          </a:p>
-          <a:p>
-            <a:pPr marL="0" indent="0">
-              <a:buNone/>
-            </a:pPr>
-            <a:r>
-              <a:rPr lang="en-US" sz="1400" b="1" dirty="0">
-                <a:solidFill>
-                  <a:schemeClr val="accent2"/>
-                </a:solidFill>
-                <a:latin typeface="Courier New" pitchFamily="49" charset="0"/>
-                <a:cs typeface="Courier New" pitchFamily="49" charset="0"/>
-              </a:rPr>
-              <a:t>	</a:t>
-            </a:r>
-            <a:r>
-              <a:rPr lang="en-US" sz="1400" b="1" dirty="0" smtClean="0">
-                <a:solidFill>
-                  <a:schemeClr val="accent2"/>
-                </a:solidFill>
-                <a:latin typeface="Courier New" pitchFamily="49" charset="0"/>
-                <a:cs typeface="Courier New" pitchFamily="49" charset="0"/>
-              </a:rPr>
-              <a:t>	    </a:t>
-            </a:r>
-          </a:p>
-          <a:p>
-            <a:pPr marL="0" indent="0">
-              <a:buNone/>
-            </a:pPr>
-            <a:r>
-              <a:rPr lang="en-US" sz="1400" b="1" dirty="0">
-                <a:solidFill>
-                  <a:schemeClr val="accent2"/>
-                </a:solidFill>
-                <a:latin typeface="Courier New" pitchFamily="49" charset="0"/>
-                <a:cs typeface="Courier New" pitchFamily="49" charset="0"/>
-              </a:rPr>
-              <a:t>	</a:t>
-            </a:r>
-            <a:r>
-              <a:rPr lang="en-US" sz="1400" b="1" dirty="0" smtClean="0">
-                <a:solidFill>
-                  <a:schemeClr val="accent2"/>
-                </a:solidFill>
-                <a:latin typeface="Courier New" pitchFamily="49" charset="0"/>
-                <a:cs typeface="Courier New" pitchFamily="49" charset="0"/>
-              </a:rPr>
-              <a:t>	  </a:t>
-            </a:r>
-            <a:r>
-              <a:rPr lang="en-US" sz="1400" b="1" dirty="0" smtClean="0">
-                <a:solidFill>
-                  <a:srgbClr val="00B050"/>
-                </a:solidFill>
-                <a:latin typeface="Courier New" pitchFamily="49" charset="0"/>
-                <a:cs typeface="Courier New" pitchFamily="49" charset="0"/>
-              </a:rPr>
-              <a:t>; </a:t>
-            </a:r>
-            <a:r>
-              <a:rPr lang="en-US" sz="1400" b="1" dirty="0" err="1">
-                <a:solidFill>
-                  <a:srgbClr val="00B050"/>
-                </a:solidFill>
-                <a:latin typeface="Courier New" pitchFamily="49" charset="0"/>
-                <a:cs typeface="Courier New" pitchFamily="49" charset="0"/>
-              </a:rPr>
-              <a:t>Btn</a:t>
-            </a:r>
-            <a:r>
-              <a:rPr lang="en-US" sz="1400" b="1" dirty="0">
-                <a:solidFill>
-                  <a:srgbClr val="00B050"/>
-                </a:solidFill>
-                <a:latin typeface="Courier New" pitchFamily="49" charset="0"/>
-                <a:cs typeface="Courier New" pitchFamily="49" charset="0"/>
-              </a:rPr>
-              <a:t> released</a:t>
-            </a:r>
-          </a:p>
-          <a:p>
-            <a:pPr marL="0" indent="0">
-              <a:buNone/>
-            </a:pPr>
-            <a:r>
-              <a:rPr lang="en-US" sz="1400" b="1" dirty="0">
-                <a:solidFill>
-                  <a:schemeClr val="accent2"/>
-                </a:solidFill>
-                <a:latin typeface="Courier New" pitchFamily="49" charset="0"/>
-                <a:cs typeface="Courier New" pitchFamily="49" charset="0"/>
-              </a:rPr>
-              <a:t>                     call   #</a:t>
-            </a:r>
-            <a:r>
-              <a:rPr lang="en-US" sz="1400" b="1" dirty="0" err="1">
-                <a:solidFill>
-                  <a:schemeClr val="accent2"/>
-                </a:solidFill>
-                <a:latin typeface="Courier New" pitchFamily="49" charset="0"/>
-                <a:cs typeface="Courier New" pitchFamily="49" charset="0"/>
-              </a:rPr>
-              <a:t>software_delay</a:t>
-            </a:r>
-            <a:endParaRPr lang="en-US" sz="1400" b="1" dirty="0">
-              <a:solidFill>
-                <a:schemeClr val="accent2"/>
-              </a:solidFill>
-              <a:latin typeface="Courier New" pitchFamily="49" charset="0"/>
-              <a:cs typeface="Courier New" pitchFamily="49" charset="0"/>
-            </a:endParaRPr>
-          </a:p>
-          <a:p>
-            <a:pPr marL="0" indent="0">
-              <a:buNone/>
-            </a:pPr>
-            <a:r>
-              <a:rPr lang="en-US" sz="1400" b="1" dirty="0">
-                <a:solidFill>
-                  <a:schemeClr val="accent2"/>
-                </a:solidFill>
-                <a:latin typeface="Courier New" pitchFamily="49" charset="0"/>
-                <a:cs typeface="Courier New" pitchFamily="49" charset="0"/>
-              </a:rPr>
-              <a:t>                     </a:t>
-            </a:r>
-            <a:r>
-              <a:rPr lang="en-US" sz="1400" b="1" dirty="0" err="1">
-                <a:solidFill>
-                  <a:schemeClr val="accent2"/>
-                </a:solidFill>
-                <a:latin typeface="Courier New" pitchFamily="49" charset="0"/>
-                <a:cs typeface="Courier New" pitchFamily="49" charset="0"/>
-              </a:rPr>
-              <a:t>jmp</a:t>
-            </a:r>
-            <a:r>
-              <a:rPr lang="en-US" sz="1400" b="1" dirty="0">
-                <a:solidFill>
-                  <a:schemeClr val="accent2"/>
-                </a:solidFill>
-                <a:latin typeface="Courier New" pitchFamily="49" charset="0"/>
-                <a:cs typeface="Courier New" pitchFamily="49" charset="0"/>
-              </a:rPr>
-              <a:t>    </a:t>
-            </a:r>
-            <a:r>
-              <a:rPr lang="en-US" sz="1400" b="1" dirty="0" err="1">
-                <a:solidFill>
-                  <a:schemeClr val="accent2"/>
-                </a:solidFill>
-                <a:latin typeface="Courier New" pitchFamily="49" charset="0"/>
-                <a:cs typeface="Courier New" pitchFamily="49" charset="0"/>
-              </a:rPr>
-              <a:t>check_btn</a:t>
-            </a:r>
-            <a:endParaRPr lang="en-US" sz="1400" b="1" dirty="0" smtClean="0">
-              <a:solidFill>
-                <a:schemeClr val="accent2"/>
-              </a:solidFill>
-              <a:latin typeface="Courier New" pitchFamily="49" charset="0"/>
-              <a:cs typeface="Courier New" pitchFamily="49" charset="0"/>
-            </a:endParaRPr>
-          </a:p>
-        </p:txBody>
-      </p:sp>
-      <p:sp>
-        <p:nvSpPr>
-          <p:cNvPr id="4" name="Rectangular Callout 3"/>
-          <p:cNvSpPr/>
-          <p:nvPr/>
-        </p:nvSpPr>
-        <p:spPr bwMode="auto">
-          <a:xfrm>
-            <a:off x="5716576" y="3487307"/>
-            <a:ext cx="3153103" cy="320066"/>
-          </a:xfrm>
-          <a:prstGeom prst="wedgeRectCallout">
-            <a:avLst>
-              <a:gd name="adj1" fmla="val -117833"/>
-              <a:gd name="adj2" fmla="val 127983"/>
-            </a:avLst>
-          </a:prstGeom>
-          <a:solidFill>
-            <a:srgbClr val="FFFF00"/>
-          </a:solidFill>
-          <a:ln w="12700" cap="flat" cmpd="sng" algn="ctr">
-            <a:solidFill>
-              <a:schemeClr val="tx1"/>
-            </a:solidFill>
-            <a:prstDash val="solid"/>
-            <a:round/>
-            <a:headEnd type="none" w="med" len="med"/>
-            <a:tailEnd type="none" w="med" len="med"/>
-          </a:ln>
-          <a:effectLst/>
-        </p:spPr>
-        <p:txBody>
-          <a:bodyPr vert="horz" wrap="square" lIns="91440" tIns="45720" rIns="91440" bIns="45720" numCol="1" rtlCol="0" anchor="t" anchorCtr="0" compatLnSpc="1">
-            <a:prstTxWarp prst="textNoShape">
-              <a:avLst/>
-            </a:prstTxWarp>
-          </a:bodyPr>
-          <a:lstStyle/>
-          <a:p>
-            <a:pPr marL="0" marR="0" indent="0" algn="ctr" defTabSz="914400" rtl="0" eaLnBrk="0" fontAlgn="base" latinLnBrk="0" hangingPunct="0">
-              <a:lnSpc>
-                <a:spcPct val="100000"/>
-              </a:lnSpc>
-              <a:spcBef>
-                <a:spcPct val="0"/>
-              </a:spcBef>
-              <a:spcAft>
-                <a:spcPct val="0"/>
-              </a:spcAft>
-              <a:buClrTx/>
-              <a:buSzTx/>
-              <a:buFontTx/>
-              <a:buNone/>
-              <a:tabLst/>
-            </a:pPr>
-            <a:r>
-              <a:rPr kumimoji="0" lang="en-US" sz="1600" b="0" i="0" u="none" strike="noStrike" cap="none" normalizeH="0" baseline="0" dirty="0" smtClean="0">
-                <a:ln>
-                  <a:noFill/>
-                </a:ln>
-                <a:solidFill>
-                  <a:schemeClr val="tx1"/>
-                </a:solidFill>
-                <a:effectLst/>
-                <a:latin typeface="Arial" charset="0"/>
-              </a:rPr>
-              <a:t>Button is push</a:t>
-            </a:r>
-            <a:r>
-              <a:rPr kumimoji="0" lang="en-US" sz="1600" b="0" i="0" u="none" strike="noStrike" cap="none" normalizeH="0" dirty="0" smtClean="0">
-                <a:ln>
-                  <a:noFill/>
-                </a:ln>
-                <a:solidFill>
-                  <a:schemeClr val="tx1"/>
-                </a:solidFill>
-                <a:effectLst/>
-                <a:latin typeface="Arial" charset="0"/>
-              </a:rPr>
-              <a:t> detected</a:t>
-            </a:r>
-            <a:endParaRPr kumimoji="0" lang="en-US" sz="1600" b="0" i="0" u="none" strike="noStrike" cap="none" normalizeH="0" baseline="0" dirty="0" smtClean="0">
-              <a:ln>
-                <a:noFill/>
-              </a:ln>
-              <a:solidFill>
-                <a:schemeClr val="tx1"/>
-              </a:solidFill>
-              <a:effectLst/>
-              <a:latin typeface="Arial" charset="0"/>
-            </a:endParaRPr>
-          </a:p>
-        </p:txBody>
-      </p:sp>
-      <p:sp>
-        <p:nvSpPr>
-          <p:cNvPr id="5" name="Rectangular Callout 4"/>
-          <p:cNvSpPr/>
-          <p:nvPr/>
-        </p:nvSpPr>
-        <p:spPr bwMode="auto">
-          <a:xfrm>
-            <a:off x="5716575" y="4977148"/>
-            <a:ext cx="3153103" cy="840328"/>
-          </a:xfrm>
-          <a:prstGeom prst="wedgeRectCallout">
-            <a:avLst>
-              <a:gd name="adj1" fmla="val -69583"/>
-              <a:gd name="adj2" fmla="val -104688"/>
-            </a:avLst>
-          </a:prstGeom>
-          <a:solidFill>
-            <a:srgbClr val="FFFF00"/>
-          </a:solidFill>
-          <a:ln w="12700" cap="flat" cmpd="sng" algn="ctr">
-            <a:solidFill>
-              <a:schemeClr val="tx1"/>
-            </a:solidFill>
-            <a:prstDash val="solid"/>
-            <a:round/>
-            <a:headEnd type="none" w="med" len="med"/>
-            <a:tailEnd type="none" w="med" len="med"/>
-          </a:ln>
-          <a:effectLst/>
-        </p:spPr>
-        <p:txBody>
-          <a:bodyPr vert="horz" wrap="square" lIns="91440" tIns="45720" rIns="91440" bIns="45720" numCol="1" rtlCol="0" anchor="t" anchorCtr="0" compatLnSpc="1">
-            <a:prstTxWarp prst="textNoShape">
-              <a:avLst/>
-            </a:prstTxWarp>
-          </a:bodyPr>
-          <a:lstStyle/>
-          <a:p>
-            <a:pPr marL="0" marR="0" indent="0" algn="ctr" defTabSz="914400" rtl="0" eaLnBrk="0" fontAlgn="base" latinLnBrk="0" hangingPunct="0">
-              <a:lnSpc>
-                <a:spcPct val="100000"/>
-              </a:lnSpc>
-              <a:spcBef>
-                <a:spcPct val="0"/>
-              </a:spcBef>
-              <a:spcAft>
-                <a:spcPct val="0"/>
-              </a:spcAft>
-              <a:buClrTx/>
-              <a:buSzTx/>
-              <a:buFontTx/>
-              <a:buNone/>
-              <a:tabLst/>
-            </a:pPr>
-            <a:r>
-              <a:rPr kumimoji="0" lang="en-US" sz="1600" b="0" i="0" u="none" strike="noStrike" cap="none" normalizeH="0" baseline="0" dirty="0" smtClean="0">
-                <a:ln>
-                  <a:noFill/>
-                </a:ln>
-                <a:solidFill>
-                  <a:schemeClr val="tx1"/>
-                </a:solidFill>
-                <a:effectLst/>
-                <a:latin typeface="Arial" charset="0"/>
-              </a:rPr>
-              <a:t>Call a delay (sleep) to wait for bouncing to settle down before reading</a:t>
-            </a:r>
-            <a:r>
-              <a:rPr kumimoji="0" lang="en-US" sz="1600" b="0" i="0" u="none" strike="noStrike" cap="none" normalizeH="0" dirty="0" smtClean="0">
-                <a:ln>
-                  <a:noFill/>
-                </a:ln>
-                <a:solidFill>
-                  <a:schemeClr val="tx1"/>
-                </a:solidFill>
-                <a:effectLst/>
-                <a:latin typeface="Arial" charset="0"/>
-              </a:rPr>
-              <a:t> again</a:t>
-            </a:r>
-            <a:endParaRPr kumimoji="0" lang="en-US" sz="1600" b="0" i="0" u="none" strike="noStrike" cap="none" normalizeH="0" baseline="0" dirty="0" smtClean="0">
-              <a:ln>
-                <a:noFill/>
-              </a:ln>
-              <a:solidFill>
-                <a:schemeClr val="tx1"/>
-              </a:solidFill>
-              <a:effectLst/>
-              <a:latin typeface="Arial" charset="0"/>
-            </a:endParaRPr>
-          </a:p>
-        </p:txBody>
-      </p:sp>
-    </p:spTree>
-    <p:extLst>
-      <p:ext uri="{BB962C8B-B14F-4D97-AF65-F5344CB8AC3E}">
-        <p14:creationId xmlns:p14="http://schemas.microsoft.com/office/powerpoint/2010/main" val="2711424685"/>
-      </p:ext>
-    </p:extLst>
-  </p:cSld>
-  <p:clrMapOvr>
-    <a:masterClrMapping/>
-  </p:clrMapOvr>
+  <p:transition spd="med"/>
   <p:timing>
     <p:tnLst>
       <p:par>
@@ -11999,12 +11151,14 @@
         </p:nvSpPr>
         <p:spPr>
           <a:xfrm>
-            <a:off x="708193" y="1574948"/>
+            <a:off x="723958" y="1551299"/>
             <a:ext cx="7772400" cy="4724400"/>
           </a:xfrm>
         </p:spPr>
         <p:txBody>
-          <a:bodyPr/>
+          <a:bodyPr>
+            <a:normAutofit fontScale="92500" lnSpcReduction="20000"/>
+          </a:bodyPr>
           <a:lstStyle/>
           <a:p>
             <a:pPr marL="0" indent="0">
@@ -12013,12 +11167,42 @@
             <a:r>
               <a:rPr lang="en-US" sz="1400" b="1" dirty="0">
                 <a:solidFill>
+                  <a:schemeClr val="accent2"/>
+                </a:solidFill>
+                <a:latin typeface="Courier New" pitchFamily="49" charset="0"/>
+                <a:cs typeface="Courier New" pitchFamily="49" charset="0"/>
+              </a:rPr>
+              <a:t>		</a:t>
+            </a:r>
+            <a:r>
+              <a:rPr lang="en-US" sz="1400" b="1" dirty="0" smtClean="0">
+                <a:solidFill>
+                  <a:schemeClr val="accent2"/>
+                </a:solidFill>
+                <a:latin typeface="Courier New" pitchFamily="49" charset="0"/>
+                <a:cs typeface="Courier New" pitchFamily="49" charset="0"/>
+              </a:rPr>
+              <a:t>    </a:t>
+            </a:r>
+            <a:r>
+              <a:rPr lang="en-US" sz="1400" b="1" dirty="0" smtClean="0">
+                <a:solidFill>
                   <a:srgbClr val="00B050"/>
                 </a:solidFill>
                 <a:latin typeface="Courier New" pitchFamily="49" charset="0"/>
                 <a:cs typeface="Courier New" pitchFamily="49" charset="0"/>
               </a:rPr>
-              <a:t>; -------------------------------------------</a:t>
+              <a:t>; </a:t>
+            </a:r>
+            <a:r>
+              <a:rPr lang="en-US" sz="1400" b="1" dirty="0">
+                <a:solidFill>
+                  <a:srgbClr val="00B050"/>
+                </a:solidFill>
+                <a:latin typeface="Courier New" pitchFamily="49" charset="0"/>
+                <a:cs typeface="Courier New" pitchFamily="49" charset="0"/>
+              </a:rPr>
+              <a:t>Setup P1.3 for button input</a:t>
             </a:r>
           </a:p>
           <a:p>
@@ -12028,12 +11212,32 @@
             <a:r>
               <a:rPr lang="en-US" sz="1400" b="1" dirty="0">
                 <a:solidFill>
-                  <a:srgbClr val="00B050"/>
-                </a:solidFill>
-                <a:latin typeface="Courier New" pitchFamily="49" charset="0"/>
-                <a:cs typeface="Courier New" pitchFamily="49" charset="0"/>
-              </a:rPr>
-              <a:t>; Software delay</a:t>
+                  <a:schemeClr val="accent2"/>
+                </a:solidFill>
+                <a:latin typeface="Courier New" pitchFamily="49" charset="0"/>
+                <a:cs typeface="Courier New" pitchFamily="49" charset="0"/>
+              </a:rPr>
+              <a:t>                     </a:t>
+            </a:r>
+            <a:r>
+              <a:rPr lang="en-US" sz="1400" b="1" dirty="0" err="1">
+                <a:solidFill>
+                  <a:schemeClr val="accent2"/>
+                </a:solidFill>
+                <a:latin typeface="Courier New" pitchFamily="49" charset="0"/>
+                <a:cs typeface="Courier New" pitchFamily="49" charset="0"/>
+              </a:rPr>
+              <a:t>bis.b</a:t>
+            </a:r>
+            <a:r>
+              <a:rPr lang="en-US" sz="1400" b="1" dirty="0">
+                <a:solidFill>
+                  <a:schemeClr val="accent2"/>
+                </a:solidFill>
+                <a:latin typeface="Courier New" pitchFamily="49" charset="0"/>
+                <a:cs typeface="Courier New" pitchFamily="49" charset="0"/>
+              </a:rPr>
+              <a:t>  #BIT3, &amp;P1OUT</a:t>
             </a:r>
           </a:p>
           <a:p>
@@ -12043,12 +11247,32 @@
             <a:r>
               <a:rPr lang="en-US" sz="1400" b="1" dirty="0">
                 <a:solidFill>
-                  <a:srgbClr val="00B050"/>
-                </a:solidFill>
-                <a:latin typeface="Courier New" pitchFamily="49" charset="0"/>
-                <a:cs typeface="Courier New" pitchFamily="49" charset="0"/>
-              </a:rPr>
-              <a:t>; Purpose:  Delays code based on value of R5</a:t>
+                  <a:schemeClr val="accent2"/>
+                </a:solidFill>
+                <a:latin typeface="Courier New" pitchFamily="49" charset="0"/>
+                <a:cs typeface="Courier New" pitchFamily="49" charset="0"/>
+              </a:rPr>
+              <a:t>                     </a:t>
+            </a:r>
+            <a:r>
+              <a:rPr lang="en-US" sz="1400" b="1" dirty="0" err="1">
+                <a:solidFill>
+                  <a:schemeClr val="accent2"/>
+                </a:solidFill>
+                <a:latin typeface="Courier New" pitchFamily="49" charset="0"/>
+                <a:cs typeface="Courier New" pitchFamily="49" charset="0"/>
+              </a:rPr>
+              <a:t>bis.b</a:t>
+            </a:r>
+            <a:r>
+              <a:rPr lang="en-US" sz="1400" b="1" dirty="0">
+                <a:solidFill>
+                  <a:schemeClr val="accent2"/>
+                </a:solidFill>
+                <a:latin typeface="Courier New" pitchFamily="49" charset="0"/>
+                <a:cs typeface="Courier New" pitchFamily="49" charset="0"/>
+              </a:rPr>
+              <a:t>  #BIT3, &amp;P1REN</a:t>
             </a:r>
           </a:p>
           <a:p>
@@ -12058,199 +11282,32 @@
             <a:r>
               <a:rPr lang="en-US" sz="1400" b="1" dirty="0">
                 <a:solidFill>
-                  <a:srgbClr val="00B050"/>
-                </a:solidFill>
-                <a:latin typeface="Courier New" pitchFamily="49" charset="0"/>
-                <a:cs typeface="Courier New" pitchFamily="49" charset="0"/>
-              </a:rPr>
-              <a:t>;	</a:t>
-            </a:r>
-            <a:r>
-              <a:rPr lang="en-US" sz="1400" b="1" dirty="0" smtClean="0">
-                <a:solidFill>
-                  <a:srgbClr val="00B050"/>
-                </a:solidFill>
-                <a:latin typeface="Courier New" pitchFamily="49" charset="0"/>
-                <a:cs typeface="Courier New" pitchFamily="49" charset="0"/>
-              </a:rPr>
-              <a:t>   R5 </a:t>
+                  <a:schemeClr val="accent2"/>
+                </a:solidFill>
+                <a:latin typeface="Courier New" pitchFamily="49" charset="0"/>
+                <a:cs typeface="Courier New" pitchFamily="49" charset="0"/>
+              </a:rPr>
+              <a:t>                     </a:t>
+            </a:r>
+            <a:r>
+              <a:rPr lang="en-US" sz="1400" b="1" dirty="0" err="1">
+                <a:solidFill>
+                  <a:schemeClr val="accent2"/>
+                </a:solidFill>
+                <a:latin typeface="Courier New" pitchFamily="49" charset="0"/>
+                <a:cs typeface="Courier New" pitchFamily="49" charset="0"/>
+              </a:rPr>
+              <a:t>bic.b</a:t>
             </a:r>
             <a:r>
               <a:rPr lang="en-US" sz="1400" b="1" dirty="0">
                 <a:solidFill>
-                  <a:srgbClr val="00B050"/>
-                </a:solidFill>
-                <a:latin typeface="Courier New" pitchFamily="49" charset="0"/>
-                <a:cs typeface="Courier New" pitchFamily="49" charset="0"/>
-              </a:rPr>
-              <a:t>is currently hard coded as </a:t>
-            </a:r>
-            <a:r>
-              <a:rPr lang="en-US" sz="1400" b="1" dirty="0" smtClean="0">
-                <a:solidFill>
-                  <a:srgbClr val="00B050"/>
-                </a:solidFill>
-                <a:latin typeface="Courier New" pitchFamily="49" charset="0"/>
-                <a:cs typeface="Courier New" pitchFamily="49" charset="0"/>
-              </a:rPr>
-              <a:t>0xAAAA</a:t>
-            </a:r>
-          </a:p>
-          <a:p>
-            <a:pPr marL="0" indent="0">
-              <a:buNone/>
-            </a:pPr>
-            <a:r>
-              <a:rPr lang="en-US" sz="1400" dirty="0" smtClean="0">
-                <a:solidFill>
-                  <a:srgbClr val="00B050"/>
-                </a:solidFill>
-                <a:latin typeface="Courier New" pitchFamily="49" charset="0"/>
-                <a:cs typeface="Courier New" pitchFamily="49" charset="0"/>
-              </a:rPr>
-              <a:t>; Destroyed: None</a:t>
-            </a:r>
-          </a:p>
-          <a:p>
-            <a:pPr marL="0" indent="0">
-              <a:buNone/>
-            </a:pPr>
-            <a:r>
-              <a:rPr lang="en-US" sz="1400" b="1" dirty="0" smtClean="0">
-                <a:solidFill>
-                  <a:srgbClr val="00B050"/>
-                </a:solidFill>
-                <a:latin typeface="Courier New" pitchFamily="49" charset="0"/>
-                <a:cs typeface="Courier New" pitchFamily="49" charset="0"/>
-              </a:rPr>
-              <a:t>; Returned: None</a:t>
-            </a:r>
-            <a:endParaRPr lang="en-US" sz="1400" b="1" dirty="0">
-              <a:solidFill>
-                <a:srgbClr val="00B050"/>
-              </a:solidFill>
-              <a:latin typeface="Courier New" pitchFamily="49" charset="0"/>
-              <a:cs typeface="Courier New" pitchFamily="49" charset="0"/>
-            </a:endParaRPr>
-          </a:p>
-          <a:p>
-            <a:pPr marL="0" indent="0">
-              <a:buNone/>
-            </a:pPr>
-            <a:r>
-              <a:rPr lang="en-US" sz="1400" b="1" dirty="0">
-                <a:solidFill>
-                  <a:srgbClr val="00B050"/>
-                </a:solidFill>
-                <a:latin typeface="Courier New" pitchFamily="49" charset="0"/>
-                <a:cs typeface="Courier New" pitchFamily="49" charset="0"/>
-              </a:rPr>
-              <a:t>; -------------------------------------------</a:t>
-            </a:r>
-          </a:p>
-          <a:p>
-            <a:pPr marL="0" indent="0">
-              <a:buNone/>
-            </a:pPr>
-            <a:r>
-              <a:rPr lang="en-US" sz="1400" b="1" dirty="0" err="1">
-                <a:solidFill>
-                  <a:schemeClr val="accent2"/>
-                </a:solidFill>
-                <a:latin typeface="Courier New" pitchFamily="49" charset="0"/>
-                <a:cs typeface="Courier New" pitchFamily="49" charset="0"/>
-              </a:rPr>
-              <a:t>software_delay</a:t>
-            </a:r>
-            <a:r>
-              <a:rPr lang="en-US" sz="1400" b="1" dirty="0">
-                <a:solidFill>
-                  <a:schemeClr val="accent2"/>
-                </a:solidFill>
-                <a:latin typeface="Courier New" pitchFamily="49" charset="0"/>
-                <a:cs typeface="Courier New" pitchFamily="49" charset="0"/>
-              </a:rPr>
-              <a:t>:</a:t>
-            </a:r>
-          </a:p>
-          <a:p>
-            <a:pPr marL="0" indent="0">
-              <a:buNone/>
-            </a:pPr>
-            <a:r>
-              <a:rPr lang="en-US" sz="1400" b="1" dirty="0">
-                <a:solidFill>
-                  <a:schemeClr val="accent2"/>
-                </a:solidFill>
-                <a:latin typeface="Courier New" pitchFamily="49" charset="0"/>
-                <a:cs typeface="Courier New" pitchFamily="49" charset="0"/>
-              </a:rPr>
-              <a:t>		</a:t>
-            </a:r>
-            <a:r>
-              <a:rPr lang="en-US" sz="1400" b="1" dirty="0" smtClean="0">
-                <a:solidFill>
-                  <a:schemeClr val="accent2"/>
-                </a:solidFill>
-                <a:latin typeface="Courier New" pitchFamily="49" charset="0"/>
-                <a:cs typeface="Courier New" pitchFamily="49" charset="0"/>
-              </a:rPr>
-              <a:t>push </a:t>
-            </a:r>
-            <a:r>
-              <a:rPr lang="en-US" sz="1400" b="1" dirty="0">
-                <a:solidFill>
-                  <a:schemeClr val="accent2"/>
-                </a:solidFill>
-                <a:latin typeface="Courier New" pitchFamily="49" charset="0"/>
-                <a:cs typeface="Courier New" pitchFamily="49" charset="0"/>
-              </a:rPr>
-              <a:t>r5</a:t>
-            </a:r>
-          </a:p>
-          <a:p>
-            <a:pPr marL="0" indent="0">
-              <a:buNone/>
-            </a:pPr>
-            <a:r>
-              <a:rPr lang="en-US" sz="1400" b="1" dirty="0">
-                <a:solidFill>
-                  <a:schemeClr val="accent2"/>
-                </a:solidFill>
-                <a:latin typeface="Courier New" pitchFamily="49" charset="0"/>
-                <a:cs typeface="Courier New" pitchFamily="49" charset="0"/>
-              </a:rPr>
-              <a:t>		</a:t>
-            </a:r>
-            <a:r>
-              <a:rPr lang="en-US" sz="1400" b="1" dirty="0" err="1" smtClean="0">
-                <a:solidFill>
-                  <a:schemeClr val="accent2"/>
-                </a:solidFill>
-                <a:latin typeface="Courier New" pitchFamily="49" charset="0"/>
-                <a:cs typeface="Courier New" pitchFamily="49" charset="0"/>
-              </a:rPr>
-              <a:t>mov.w</a:t>
-            </a:r>
-            <a:r>
-              <a:rPr lang="en-US" sz="1400" b="1" dirty="0" smtClean="0">
-                <a:solidFill>
-                  <a:schemeClr val="accent2"/>
-                </a:solidFill>
-                <a:latin typeface="Courier New" pitchFamily="49" charset="0"/>
-                <a:cs typeface="Courier New" pitchFamily="49" charset="0"/>
-              </a:rPr>
-              <a:t> </a:t>
-            </a:r>
-            <a:r>
-              <a:rPr lang="en-US" sz="1400" b="1" dirty="0">
-                <a:solidFill>
-                  <a:schemeClr val="accent2"/>
-                </a:solidFill>
-                <a:latin typeface="Courier New" pitchFamily="49" charset="0"/>
-                <a:cs typeface="Courier New" pitchFamily="49" charset="0"/>
-              </a:rPr>
-              <a:t>#0xaaaa, r5</a:t>
+                  <a:schemeClr val="accent2"/>
+                </a:solidFill>
+                <a:latin typeface="Courier New" pitchFamily="49" charset="0"/>
+                <a:cs typeface="Courier New" pitchFamily="49" charset="0"/>
+              </a:rPr>
+              <a:t>  #BIT3, &amp;P1DIR</a:t>
             </a:r>
           </a:p>
           <a:p>
@@ -12277,17 +11334,27 @@
                 <a:latin typeface="Courier New" pitchFamily="49" charset="0"/>
                 <a:cs typeface="Courier New" pitchFamily="49" charset="0"/>
               </a:rPr>
-              <a:t>delay:		</a:t>
-            </a:r>
-            <a:r>
-              <a:rPr lang="en-US" sz="1400" b="1" dirty="0" err="1" smtClean="0">
-                <a:solidFill>
-                  <a:schemeClr val="accent2"/>
-                </a:solidFill>
-                <a:latin typeface="Courier New" pitchFamily="49" charset="0"/>
-                <a:cs typeface="Courier New" pitchFamily="49" charset="0"/>
-              </a:rPr>
-              <a:t>dec</a:t>
+              <a:t>                     </a:t>
+            </a:r>
+            <a:r>
+              <a:rPr lang="en-US" sz="1400" b="1" dirty="0" err="1">
+                <a:solidFill>
+                  <a:schemeClr val="accent2"/>
+                </a:solidFill>
+                <a:latin typeface="Courier New" pitchFamily="49" charset="0"/>
+                <a:cs typeface="Courier New" pitchFamily="49" charset="0"/>
+              </a:rPr>
+              <a:t>clr</a:t>
+            </a:r>
+            <a:r>
+              <a:rPr lang="en-US" sz="1400" b="1" dirty="0">
+                <a:solidFill>
+                  <a:schemeClr val="accent2"/>
+                </a:solidFill>
+                <a:latin typeface="Courier New" pitchFamily="49" charset="0"/>
+                <a:cs typeface="Courier New" pitchFamily="49" charset="0"/>
+              </a:rPr>
+              <a:t> </a:t>
             </a:r>
             <a:r>
               <a:rPr lang="en-US" sz="1400" b="1" dirty="0" smtClean="0">
@@ -12297,123 +11364,60 @@
                 <a:latin typeface="Courier New" pitchFamily="49" charset="0"/>
                 <a:cs typeface="Courier New" pitchFamily="49" charset="0"/>
               </a:rPr>
+              <a:t>R4</a:t>
+            </a:r>
+            <a:r>
+              <a:rPr lang="en-US" sz="1400" dirty="0">
+                <a:solidFill>
+                  <a:schemeClr val="accent2"/>
+                </a:solidFill>
+                <a:latin typeface="Courier New" pitchFamily="49" charset="0"/>
+                <a:cs typeface="Courier New" pitchFamily="49" charset="0"/>
+              </a:rPr>
               <a:t> </a:t>
             </a:r>
             <a:r>
-              <a:rPr lang="en-US" sz="1400" b="1" dirty="0">
-                <a:solidFill>
-                  <a:schemeClr val="accent2"/>
-                </a:solidFill>
-                <a:latin typeface="Courier New" pitchFamily="49" charset="0"/>
-                <a:cs typeface="Courier New" pitchFamily="49" charset="0"/>
-              </a:rPr>
-              <a:t>r5</a:t>
-            </a:r>
+              <a:rPr lang="en-US" sz="1400" b="1" dirty="0" smtClean="0">
+                <a:solidFill>
+                  <a:srgbClr val="00B050"/>
+                </a:solidFill>
+                <a:latin typeface="Courier New" pitchFamily="49" charset="0"/>
+                <a:cs typeface="Courier New" pitchFamily="49" charset="0"/>
+              </a:rPr>
+              <a:t>; Variable to hold the number </a:t>
+            </a:r>
+            <a:r>
+              <a:rPr lang="en-US" sz="1400" dirty="0" smtClean="0">
+                <a:solidFill>
+                  <a:srgbClr val="00B050"/>
+                </a:solidFill>
+                <a:latin typeface="Courier New" pitchFamily="49" charset="0"/>
+                <a:cs typeface="Courier New" pitchFamily="49" charset="0"/>
+              </a:rPr>
+              <a:t> </a:t>
+            </a:r>
+            <a:r>
+              <a:rPr lang="en-US" sz="1400" b="1" dirty="0" smtClean="0">
+                <a:solidFill>
+                  <a:srgbClr val="00B050"/>
+                </a:solidFill>
+                <a:latin typeface="Courier New" pitchFamily="49" charset="0"/>
+                <a:cs typeface="Courier New" pitchFamily="49" charset="0"/>
+              </a:rPr>
+              <a:t>of button pushes</a:t>
+            </a:r>
+            <a:endParaRPr lang="en-US" sz="1400" b="1" dirty="0">
+              <a:solidFill>
+                <a:srgbClr val="00B050"/>
+              </a:solidFill>
+              <a:latin typeface="Courier New" pitchFamily="49" charset="0"/>
+              <a:cs typeface="Courier New" pitchFamily="49" charset="0"/>
+            </a:endParaRPr>
           </a:p>
           <a:p>
             <a:pPr marL="0" indent="0">
               <a:buNone/>
             </a:pPr>
-            <a:r>
-              <a:rPr lang="en-US" sz="1400" b="1" dirty="0">
-                <a:solidFill>
-                  <a:schemeClr val="accent2"/>
-                </a:solidFill>
-                <a:latin typeface="Courier New" pitchFamily="49" charset="0"/>
-                <a:cs typeface="Courier New" pitchFamily="49" charset="0"/>
-              </a:rPr>
-              <a:t>		</a:t>
-            </a:r>
-            <a:r>
-              <a:rPr lang="en-US" sz="1400" b="1" dirty="0" err="1" smtClean="0">
-                <a:solidFill>
-                  <a:schemeClr val="accent2"/>
-                </a:solidFill>
-                <a:latin typeface="Courier New" pitchFamily="49" charset="0"/>
-                <a:cs typeface="Courier New" pitchFamily="49" charset="0"/>
-              </a:rPr>
-              <a:t>jnz</a:t>
-            </a:r>
-            <a:r>
-              <a:rPr lang="en-US" sz="1400" b="1" dirty="0" smtClean="0">
-                <a:solidFill>
-                  <a:schemeClr val="accent2"/>
-                </a:solidFill>
-                <a:latin typeface="Courier New" pitchFamily="49" charset="0"/>
-                <a:cs typeface="Courier New" pitchFamily="49" charset="0"/>
-              </a:rPr>
-              <a:t> </a:t>
-            </a:r>
-            <a:r>
-              <a:rPr lang="en-US" sz="1400" b="1" dirty="0">
-                <a:solidFill>
-                  <a:schemeClr val="accent2"/>
-                </a:solidFill>
-                <a:latin typeface="Courier New" pitchFamily="49" charset="0"/>
-                <a:cs typeface="Courier New" pitchFamily="49" charset="0"/>
-              </a:rPr>
-              <a:t>delay</a:t>
-            </a:r>
-          </a:p>
-          <a:p>
-            <a:pPr marL="0" indent="0">
-              <a:buNone/>
-            </a:pPr>
-            <a:r>
-              <a:rPr lang="en-US" sz="1400" b="1" dirty="0">
-                <a:solidFill>
-                  <a:schemeClr val="accent2"/>
-                </a:solidFill>
-                <a:latin typeface="Courier New" pitchFamily="49" charset="0"/>
-                <a:cs typeface="Courier New" pitchFamily="49" charset="0"/>
-              </a:rPr>
-              <a:t>		</a:t>
-            </a:r>
-            <a:r>
-              <a:rPr lang="en-US" sz="1400" b="1" dirty="0" smtClean="0">
-                <a:solidFill>
-                  <a:schemeClr val="accent2"/>
-                </a:solidFill>
-                <a:latin typeface="Courier New" pitchFamily="49" charset="0"/>
-                <a:cs typeface="Courier New" pitchFamily="49" charset="0"/>
-              </a:rPr>
-              <a:t>pop </a:t>
-            </a:r>
-            <a:r>
-              <a:rPr lang="en-US" sz="1400" b="1" dirty="0">
-                <a:solidFill>
-                  <a:schemeClr val="accent2"/>
-                </a:solidFill>
-                <a:latin typeface="Courier New" pitchFamily="49" charset="0"/>
-                <a:cs typeface="Courier New" pitchFamily="49" charset="0"/>
-              </a:rPr>
-              <a:t>r5</a:t>
-            </a:r>
-          </a:p>
-          <a:p>
-            <a:pPr marL="0" indent="0">
-              <a:buNone/>
-            </a:pPr>
-            <a:r>
-              <a:rPr lang="en-US" sz="1400" b="1" dirty="0">
-                <a:solidFill>
-                  <a:schemeClr val="accent2"/>
-                </a:solidFill>
-                <a:latin typeface="Courier New" pitchFamily="49" charset="0"/>
-                <a:cs typeface="Courier New" pitchFamily="49" charset="0"/>
-              </a:rPr>
-              <a:t>		</a:t>
-            </a:r>
-            <a:r>
-              <a:rPr lang="en-US" sz="1400" b="1" dirty="0" smtClean="0">
-                <a:solidFill>
-                  <a:schemeClr val="accent2"/>
-                </a:solidFill>
-                <a:latin typeface="Courier New" pitchFamily="49" charset="0"/>
-                <a:cs typeface="Courier New" pitchFamily="49" charset="0"/>
-              </a:rPr>
-              <a:t>ret</a:t>
-            </a:r>
             <a:endParaRPr lang="en-US" sz="1400" b="1" dirty="0">
               <a:solidFill>
                 <a:schemeClr val="accent2"/>
@@ -12434,11 +11438,572 @@
                 <a:latin typeface="Courier New" pitchFamily="49" charset="0"/>
                 <a:cs typeface="Courier New" pitchFamily="49" charset="0"/>
               </a:rPr>
-              <a:t>; End Software delay ---------------------------</a:t>
+              <a:t>; Increment </a:t>
+            </a:r>
+            <a:r>
+              <a:rPr lang="en-US" sz="1400" b="1" dirty="0" err="1">
+                <a:solidFill>
+                  <a:srgbClr val="00B050"/>
+                </a:solidFill>
+                <a:latin typeface="Courier New" pitchFamily="49" charset="0"/>
+                <a:cs typeface="Courier New" pitchFamily="49" charset="0"/>
+              </a:rPr>
+              <a:t>Btn</a:t>
+            </a:r>
+            <a:r>
+              <a:rPr lang="en-US" sz="1400" b="1" dirty="0">
+                <a:solidFill>
+                  <a:srgbClr val="00B050"/>
+                </a:solidFill>
+                <a:latin typeface="Courier New" pitchFamily="49" charset="0"/>
+                <a:cs typeface="Courier New" pitchFamily="49" charset="0"/>
+              </a:rPr>
+              <a:t> Counter on </a:t>
+            </a:r>
+            <a:r>
+              <a:rPr lang="en-US" sz="1400" b="1" dirty="0" err="1">
+                <a:solidFill>
+                  <a:srgbClr val="00B050"/>
+                </a:solidFill>
+                <a:latin typeface="Courier New" pitchFamily="49" charset="0"/>
+                <a:cs typeface="Courier New" pitchFamily="49" charset="0"/>
+              </a:rPr>
+              <a:t>Btn</a:t>
+            </a:r>
+            <a:r>
+              <a:rPr lang="en-US" sz="1400" b="1" dirty="0">
+                <a:solidFill>
+                  <a:srgbClr val="00B050"/>
+                </a:solidFill>
+                <a:latin typeface="Courier New" pitchFamily="49" charset="0"/>
+                <a:cs typeface="Courier New" pitchFamily="49" charset="0"/>
+              </a:rPr>
+              <a:t> press</a:t>
+            </a:r>
+          </a:p>
+          <a:p>
+            <a:pPr marL="0" indent="0">
+              <a:buNone/>
+            </a:pPr>
+            <a:r>
+              <a:rPr lang="en-US" sz="1400" b="1" dirty="0">
+                <a:solidFill>
+                  <a:srgbClr val="00B050"/>
+                </a:solidFill>
+                <a:latin typeface="Courier New" pitchFamily="49" charset="0"/>
+                <a:cs typeface="Courier New" pitchFamily="49" charset="0"/>
+              </a:rPr>
+              <a:t>; A delay is used immediately after the press and release</a:t>
+            </a:r>
+          </a:p>
+          <a:p>
+            <a:pPr marL="0" indent="0">
+              <a:buNone/>
+            </a:pPr>
+            <a:r>
+              <a:rPr lang="en-US" sz="1400" b="1" dirty="0" err="1">
+                <a:solidFill>
+                  <a:schemeClr val="accent2"/>
+                </a:solidFill>
+                <a:latin typeface="Courier New" pitchFamily="49" charset="0"/>
+                <a:cs typeface="Courier New" pitchFamily="49" charset="0"/>
+              </a:rPr>
+              <a:t>check_btn</a:t>
+            </a:r>
+            <a:r>
+              <a:rPr lang="en-US" sz="1400" b="1" dirty="0">
+                <a:solidFill>
+                  <a:schemeClr val="accent2"/>
+                </a:solidFill>
+                <a:latin typeface="Courier New" pitchFamily="49" charset="0"/>
+                <a:cs typeface="Courier New" pitchFamily="49" charset="0"/>
+              </a:rPr>
+              <a:t>:           </a:t>
+            </a:r>
+            <a:r>
+              <a:rPr lang="en-US" sz="1400" b="1" dirty="0" err="1">
+                <a:solidFill>
+                  <a:schemeClr val="accent2"/>
+                </a:solidFill>
+                <a:latin typeface="Courier New" pitchFamily="49" charset="0"/>
+                <a:cs typeface="Courier New" pitchFamily="49" charset="0"/>
+              </a:rPr>
+              <a:t>bit.b</a:t>
+            </a:r>
+            <a:r>
+              <a:rPr lang="en-US" sz="1400" b="1" dirty="0">
+                <a:solidFill>
+                  <a:schemeClr val="accent2"/>
+                </a:solidFill>
+                <a:latin typeface="Courier New" pitchFamily="49" charset="0"/>
+                <a:cs typeface="Courier New" pitchFamily="49" charset="0"/>
+              </a:rPr>
+              <a:t>  #BIT3, &amp;P1IN</a:t>
+            </a:r>
+          </a:p>
+          <a:p>
+            <a:pPr marL="0" indent="0">
+              <a:buNone/>
+            </a:pPr>
+            <a:r>
+              <a:rPr lang="en-US" sz="1400" b="1" dirty="0">
+                <a:solidFill>
+                  <a:schemeClr val="accent2"/>
+                </a:solidFill>
+                <a:latin typeface="Courier New" pitchFamily="49" charset="0"/>
+                <a:cs typeface="Courier New" pitchFamily="49" charset="0"/>
+              </a:rPr>
+              <a:t>                     </a:t>
+            </a:r>
+            <a:r>
+              <a:rPr lang="en-US" sz="1400" b="1" dirty="0" err="1">
+                <a:solidFill>
+                  <a:schemeClr val="accent2"/>
+                </a:solidFill>
+                <a:latin typeface="Courier New" pitchFamily="49" charset="0"/>
+                <a:cs typeface="Courier New" pitchFamily="49" charset="0"/>
+              </a:rPr>
+              <a:t>jnz</a:t>
+            </a:r>
+            <a:r>
+              <a:rPr lang="en-US" sz="1400" b="1" dirty="0">
+                <a:solidFill>
+                  <a:schemeClr val="accent2"/>
+                </a:solidFill>
+                <a:latin typeface="Courier New" pitchFamily="49" charset="0"/>
+                <a:cs typeface="Courier New" pitchFamily="49" charset="0"/>
+              </a:rPr>
+              <a:t>    </a:t>
+            </a:r>
+            <a:r>
+              <a:rPr lang="en-US" sz="1400" b="1" dirty="0" err="1">
+                <a:solidFill>
+                  <a:schemeClr val="accent2"/>
+                </a:solidFill>
+                <a:latin typeface="Courier New" pitchFamily="49" charset="0"/>
+                <a:cs typeface="Courier New" pitchFamily="49" charset="0"/>
+              </a:rPr>
+              <a:t>check_btn</a:t>
+            </a:r>
+            <a:endParaRPr lang="en-US" sz="1400" b="1" dirty="0">
+              <a:solidFill>
+                <a:schemeClr val="accent2"/>
+              </a:solidFill>
+              <a:latin typeface="Courier New" pitchFamily="49" charset="0"/>
+              <a:cs typeface="Courier New" pitchFamily="49" charset="0"/>
+            </a:endParaRPr>
+          </a:p>
+          <a:p>
+            <a:pPr marL="0" indent="0">
+              <a:buNone/>
+            </a:pPr>
+            <a:endParaRPr lang="en-US" sz="1400" b="1" dirty="0">
+              <a:solidFill>
+                <a:schemeClr val="accent2"/>
+              </a:solidFill>
+              <a:latin typeface="Courier New" pitchFamily="49" charset="0"/>
+              <a:cs typeface="Courier New" pitchFamily="49" charset="0"/>
+            </a:endParaRPr>
+          </a:p>
+          <a:p>
+            <a:pPr marL="0" indent="0">
+              <a:buNone/>
+            </a:pPr>
+            <a:r>
+              <a:rPr lang="en-US" sz="1400" b="1" dirty="0">
+                <a:solidFill>
+                  <a:schemeClr val="accent2"/>
+                </a:solidFill>
+                <a:latin typeface="Courier New" pitchFamily="49" charset="0"/>
+                <a:cs typeface="Courier New" pitchFamily="49" charset="0"/>
+              </a:rPr>
+              <a:t>                     </a:t>
+            </a:r>
+            <a:r>
+              <a:rPr lang="en-US" sz="1400" b="1" dirty="0" err="1">
+                <a:solidFill>
+                  <a:schemeClr val="accent2"/>
+                </a:solidFill>
+                <a:latin typeface="Courier New" pitchFamily="49" charset="0"/>
+                <a:cs typeface="Courier New" pitchFamily="49" charset="0"/>
+              </a:rPr>
+              <a:t>inc</a:t>
+            </a:r>
+            <a:r>
+              <a:rPr lang="en-US" sz="1400" b="1" dirty="0">
+                <a:solidFill>
+                  <a:schemeClr val="accent2"/>
+                </a:solidFill>
+                <a:latin typeface="Courier New" pitchFamily="49" charset="0"/>
+                <a:cs typeface="Courier New" pitchFamily="49" charset="0"/>
+              </a:rPr>
+              <a:t> R4</a:t>
+            </a:r>
+          </a:p>
+          <a:p>
+            <a:pPr marL="0" indent="0">
+              <a:buNone/>
+            </a:pPr>
+            <a:endParaRPr lang="en-US" sz="1400" b="1" dirty="0">
+              <a:solidFill>
+                <a:schemeClr val="accent2"/>
+              </a:solidFill>
+              <a:latin typeface="Courier New" pitchFamily="49" charset="0"/>
+              <a:cs typeface="Courier New" pitchFamily="49" charset="0"/>
+            </a:endParaRPr>
+          </a:p>
+          <a:p>
+            <a:pPr marL="0" indent="0">
+              <a:buNone/>
+            </a:pPr>
+            <a:r>
+              <a:rPr lang="en-US" sz="1400" b="1" dirty="0">
+                <a:solidFill>
+                  <a:schemeClr val="accent2"/>
+                </a:solidFill>
+                <a:latin typeface="Courier New" pitchFamily="49" charset="0"/>
+                <a:cs typeface="Courier New" pitchFamily="49" charset="0"/>
+              </a:rPr>
+              <a:t>                     call   #</a:t>
+            </a:r>
+            <a:r>
+              <a:rPr lang="en-US" sz="1400" b="1" dirty="0" err="1">
+                <a:solidFill>
+                  <a:schemeClr val="accent2"/>
+                </a:solidFill>
+                <a:latin typeface="Courier New" pitchFamily="49" charset="0"/>
+                <a:cs typeface="Courier New" pitchFamily="49" charset="0"/>
+              </a:rPr>
+              <a:t>software_delay</a:t>
+            </a:r>
+            <a:endParaRPr lang="en-US" sz="1400" b="1" dirty="0">
+              <a:solidFill>
+                <a:schemeClr val="accent2"/>
+              </a:solidFill>
+              <a:latin typeface="Courier New" pitchFamily="49" charset="0"/>
+              <a:cs typeface="Courier New" pitchFamily="49" charset="0"/>
+            </a:endParaRPr>
+          </a:p>
+          <a:p>
+            <a:pPr marL="0" indent="0">
+              <a:buNone/>
+            </a:pPr>
+            <a:r>
+              <a:rPr lang="en-US" sz="1400" b="1" dirty="0">
+                <a:solidFill>
+                  <a:schemeClr val="accent2"/>
+                </a:solidFill>
+                <a:latin typeface="Courier New" pitchFamily="49" charset="0"/>
+                <a:cs typeface="Courier New" pitchFamily="49" charset="0"/>
+              </a:rPr>
+              <a:t>                     </a:t>
+            </a:r>
+            <a:r>
+              <a:rPr lang="en-US" sz="1400" b="1" dirty="0" err="1">
+                <a:solidFill>
+                  <a:schemeClr val="accent2"/>
+                </a:solidFill>
+                <a:latin typeface="Courier New" pitchFamily="49" charset="0"/>
+                <a:cs typeface="Courier New" pitchFamily="49" charset="0"/>
+              </a:rPr>
+              <a:t>jmp</a:t>
+            </a:r>
+            <a:r>
+              <a:rPr lang="en-US" sz="1400" b="1" dirty="0">
+                <a:solidFill>
+                  <a:schemeClr val="accent2"/>
+                </a:solidFill>
+                <a:latin typeface="Courier New" pitchFamily="49" charset="0"/>
+                <a:cs typeface="Courier New" pitchFamily="49" charset="0"/>
+              </a:rPr>
+              <a:t>    </a:t>
+            </a:r>
+            <a:r>
+              <a:rPr lang="en-US" sz="1400" b="1" dirty="0" err="1">
+                <a:solidFill>
+                  <a:schemeClr val="accent2"/>
+                </a:solidFill>
+                <a:latin typeface="Courier New" pitchFamily="49" charset="0"/>
+                <a:cs typeface="Courier New" pitchFamily="49" charset="0"/>
+              </a:rPr>
+              <a:t>btn_pushed</a:t>
+            </a:r>
+            <a:endParaRPr lang="en-US" sz="1400" b="1" dirty="0">
+              <a:solidFill>
+                <a:schemeClr val="accent2"/>
+              </a:solidFill>
+              <a:latin typeface="Courier New" pitchFamily="49" charset="0"/>
+              <a:cs typeface="Courier New" pitchFamily="49" charset="0"/>
+            </a:endParaRPr>
+          </a:p>
+          <a:p>
+            <a:pPr marL="0" indent="0">
+              <a:buNone/>
+            </a:pPr>
+            <a:endParaRPr lang="en-US" sz="1400" b="1" dirty="0">
+              <a:solidFill>
+                <a:schemeClr val="accent2"/>
+              </a:solidFill>
+              <a:latin typeface="Courier New" pitchFamily="49" charset="0"/>
+              <a:cs typeface="Courier New" pitchFamily="49" charset="0"/>
+            </a:endParaRPr>
+          </a:p>
+          <a:p>
+            <a:pPr marL="0" indent="0">
+              <a:buNone/>
+            </a:pPr>
+            <a:r>
+              <a:rPr lang="en-US" sz="1400" b="1" dirty="0" err="1">
+                <a:solidFill>
+                  <a:schemeClr val="accent2"/>
+                </a:solidFill>
+                <a:latin typeface="Courier New" pitchFamily="49" charset="0"/>
+                <a:cs typeface="Courier New" pitchFamily="49" charset="0"/>
+              </a:rPr>
+              <a:t>btn_pushed</a:t>
+            </a:r>
+            <a:r>
+              <a:rPr lang="en-US" sz="1400" b="1" dirty="0">
+                <a:solidFill>
+                  <a:schemeClr val="accent2"/>
+                </a:solidFill>
+                <a:latin typeface="Courier New" pitchFamily="49" charset="0"/>
+                <a:cs typeface="Courier New" pitchFamily="49" charset="0"/>
+              </a:rPr>
+              <a:t>:          </a:t>
+            </a:r>
+            <a:r>
+              <a:rPr lang="en-US" sz="1400" b="1" dirty="0" err="1">
+                <a:solidFill>
+                  <a:schemeClr val="accent2"/>
+                </a:solidFill>
+                <a:latin typeface="Courier New" pitchFamily="49" charset="0"/>
+                <a:cs typeface="Courier New" pitchFamily="49" charset="0"/>
+              </a:rPr>
+              <a:t>bit.b</a:t>
+            </a:r>
+            <a:r>
+              <a:rPr lang="en-US" sz="1400" b="1" dirty="0">
+                <a:solidFill>
+                  <a:schemeClr val="accent2"/>
+                </a:solidFill>
+                <a:latin typeface="Courier New" pitchFamily="49" charset="0"/>
+                <a:cs typeface="Courier New" pitchFamily="49" charset="0"/>
+              </a:rPr>
+              <a:t>  #BIT3, &amp;P1IN</a:t>
+            </a:r>
+          </a:p>
+          <a:p>
+            <a:pPr marL="0" indent="0">
+              <a:buNone/>
+            </a:pPr>
+            <a:r>
+              <a:rPr lang="en-US" sz="1400" b="1" dirty="0">
+                <a:solidFill>
+                  <a:schemeClr val="accent2"/>
+                </a:solidFill>
+                <a:latin typeface="Courier New" pitchFamily="49" charset="0"/>
+                <a:cs typeface="Courier New" pitchFamily="49" charset="0"/>
+              </a:rPr>
+              <a:t>                     </a:t>
+            </a:r>
+            <a:r>
+              <a:rPr lang="en-US" sz="1400" b="1" dirty="0" err="1">
+                <a:solidFill>
+                  <a:schemeClr val="accent2"/>
+                </a:solidFill>
+                <a:latin typeface="Courier New" pitchFamily="49" charset="0"/>
+                <a:cs typeface="Courier New" pitchFamily="49" charset="0"/>
+              </a:rPr>
+              <a:t>jz</a:t>
+            </a:r>
+            <a:r>
+              <a:rPr lang="en-US" sz="1400" b="1" dirty="0">
+                <a:solidFill>
+                  <a:schemeClr val="accent2"/>
+                </a:solidFill>
+                <a:latin typeface="Courier New" pitchFamily="49" charset="0"/>
+                <a:cs typeface="Courier New" pitchFamily="49" charset="0"/>
+              </a:rPr>
+              <a:t>     </a:t>
+            </a:r>
+            <a:r>
+              <a:rPr lang="en-US" sz="1400" b="1" dirty="0" err="1" smtClean="0">
+                <a:solidFill>
+                  <a:schemeClr val="accent2"/>
+                </a:solidFill>
+                <a:latin typeface="Courier New" pitchFamily="49" charset="0"/>
+                <a:cs typeface="Courier New" pitchFamily="49" charset="0"/>
+              </a:rPr>
+              <a:t>btn_pushed</a:t>
             </a:r>
             <a:endParaRPr lang="en-US" sz="1400" b="1" dirty="0" smtClean="0">
               <a:solidFill>
-                <a:srgbClr val="00B050"/>
+                <a:schemeClr val="accent2"/>
+              </a:solidFill>
+              <a:latin typeface="Courier New" pitchFamily="49" charset="0"/>
+              <a:cs typeface="Courier New" pitchFamily="49" charset="0"/>
+            </a:endParaRPr>
+          </a:p>
+          <a:p>
+            <a:pPr marL="0" indent="0">
+              <a:buNone/>
+            </a:pPr>
+            <a:r>
+              <a:rPr lang="en-US" sz="1400" b="1" dirty="0">
+                <a:solidFill>
+                  <a:schemeClr val="accent2"/>
+                </a:solidFill>
+                <a:latin typeface="Courier New" pitchFamily="49" charset="0"/>
+                <a:cs typeface="Courier New" pitchFamily="49" charset="0"/>
+              </a:rPr>
+              <a:t>	</a:t>
+            </a:r>
+            <a:r>
+              <a:rPr lang="en-US" sz="1400" b="1" dirty="0" smtClean="0">
+                <a:solidFill>
+                  <a:schemeClr val="accent2"/>
+                </a:solidFill>
+                <a:latin typeface="Courier New" pitchFamily="49" charset="0"/>
+                <a:cs typeface="Courier New" pitchFamily="49" charset="0"/>
+              </a:rPr>
+              <a:t>	    </a:t>
+            </a:r>
+          </a:p>
+          <a:p>
+            <a:pPr marL="0" indent="0">
+              <a:buNone/>
+            </a:pPr>
+            <a:r>
+              <a:rPr lang="en-US" sz="1400" b="1" dirty="0">
+                <a:solidFill>
+                  <a:schemeClr val="accent2"/>
+                </a:solidFill>
+                <a:latin typeface="Courier New" pitchFamily="49" charset="0"/>
+                <a:cs typeface="Courier New" pitchFamily="49" charset="0"/>
+              </a:rPr>
+              <a:t>	</a:t>
+            </a:r>
+            <a:r>
+              <a:rPr lang="en-US" sz="1400" b="1" dirty="0" smtClean="0">
+                <a:solidFill>
+                  <a:schemeClr val="accent2"/>
+                </a:solidFill>
+                <a:latin typeface="Courier New" pitchFamily="49" charset="0"/>
+                <a:cs typeface="Courier New" pitchFamily="49" charset="0"/>
+              </a:rPr>
+              <a:t>	  </a:t>
+            </a:r>
+            <a:r>
+              <a:rPr lang="en-US" sz="1400" b="1" dirty="0" smtClean="0">
+                <a:solidFill>
+                  <a:srgbClr val="00B050"/>
+                </a:solidFill>
+                <a:latin typeface="Courier New" pitchFamily="49" charset="0"/>
+                <a:cs typeface="Courier New" pitchFamily="49" charset="0"/>
+              </a:rPr>
+              <a:t>; </a:t>
+            </a:r>
+            <a:r>
+              <a:rPr lang="en-US" sz="1400" b="1" dirty="0" err="1">
+                <a:solidFill>
+                  <a:srgbClr val="00B050"/>
+                </a:solidFill>
+                <a:latin typeface="Courier New" pitchFamily="49" charset="0"/>
+                <a:cs typeface="Courier New" pitchFamily="49" charset="0"/>
+              </a:rPr>
+              <a:t>Btn</a:t>
+            </a:r>
+            <a:r>
+              <a:rPr lang="en-US" sz="1400" b="1" dirty="0">
+                <a:solidFill>
+                  <a:srgbClr val="00B050"/>
+                </a:solidFill>
+                <a:latin typeface="Courier New" pitchFamily="49" charset="0"/>
+                <a:cs typeface="Courier New" pitchFamily="49" charset="0"/>
+              </a:rPr>
+              <a:t> released</a:t>
+            </a:r>
+          </a:p>
+          <a:p>
+            <a:pPr marL="0" indent="0">
+              <a:buNone/>
+            </a:pPr>
+            <a:r>
+              <a:rPr lang="en-US" sz="1400" b="1" dirty="0">
+                <a:solidFill>
+                  <a:schemeClr val="accent2"/>
+                </a:solidFill>
+                <a:latin typeface="Courier New" pitchFamily="49" charset="0"/>
+                <a:cs typeface="Courier New" pitchFamily="49" charset="0"/>
+              </a:rPr>
+              <a:t>                     call   #</a:t>
+            </a:r>
+            <a:r>
+              <a:rPr lang="en-US" sz="1400" b="1" dirty="0" err="1">
+                <a:solidFill>
+                  <a:schemeClr val="accent2"/>
+                </a:solidFill>
+                <a:latin typeface="Courier New" pitchFamily="49" charset="0"/>
+                <a:cs typeface="Courier New" pitchFamily="49" charset="0"/>
+              </a:rPr>
+              <a:t>software_delay</a:t>
+            </a:r>
+            <a:endParaRPr lang="en-US" sz="1400" b="1" dirty="0">
+              <a:solidFill>
+                <a:schemeClr val="accent2"/>
+              </a:solidFill>
+              <a:latin typeface="Courier New" pitchFamily="49" charset="0"/>
+              <a:cs typeface="Courier New" pitchFamily="49" charset="0"/>
+            </a:endParaRPr>
+          </a:p>
+          <a:p>
+            <a:pPr marL="0" indent="0">
+              <a:buNone/>
+            </a:pPr>
+            <a:r>
+              <a:rPr lang="en-US" sz="1400" b="1" dirty="0">
+                <a:solidFill>
+                  <a:schemeClr val="accent2"/>
+                </a:solidFill>
+                <a:latin typeface="Courier New" pitchFamily="49" charset="0"/>
+                <a:cs typeface="Courier New" pitchFamily="49" charset="0"/>
+              </a:rPr>
+              <a:t>                     </a:t>
+            </a:r>
+            <a:r>
+              <a:rPr lang="en-US" sz="1400" b="1" dirty="0" err="1">
+                <a:solidFill>
+                  <a:schemeClr val="accent2"/>
+                </a:solidFill>
+                <a:latin typeface="Courier New" pitchFamily="49" charset="0"/>
+                <a:cs typeface="Courier New" pitchFamily="49" charset="0"/>
+              </a:rPr>
+              <a:t>jmp</a:t>
+            </a:r>
+            <a:r>
+              <a:rPr lang="en-US" sz="1400" b="1" dirty="0">
+                <a:solidFill>
+                  <a:schemeClr val="accent2"/>
+                </a:solidFill>
+                <a:latin typeface="Courier New" pitchFamily="49" charset="0"/>
+                <a:cs typeface="Courier New" pitchFamily="49" charset="0"/>
+              </a:rPr>
+              <a:t>    </a:t>
+            </a:r>
+            <a:r>
+              <a:rPr lang="en-US" sz="1400" b="1" dirty="0" err="1">
+                <a:solidFill>
+                  <a:schemeClr val="accent2"/>
+                </a:solidFill>
+                <a:latin typeface="Courier New" pitchFamily="49" charset="0"/>
+                <a:cs typeface="Courier New" pitchFamily="49" charset="0"/>
+              </a:rPr>
+              <a:t>check_btn</a:t>
+            </a:r>
+            <a:endParaRPr lang="en-US" sz="1400" b="1" dirty="0" smtClean="0">
+              <a:solidFill>
+                <a:schemeClr val="accent2"/>
               </a:solidFill>
               <a:latin typeface="Courier New" pitchFamily="49" charset="0"/>
               <a:cs typeface="Courier New" pitchFamily="49" charset="0"/>
@@ -12454,13 +12019,13 @@
         </p:nvSpPr>
         <p:spPr bwMode="auto">
           <a:xfrm>
-            <a:off x="5716577" y="2648608"/>
-            <a:ext cx="3153103" cy="1198179"/>
+            <a:off x="5716576" y="3487307"/>
+            <a:ext cx="3153103" cy="320066"/>
           </a:xfrm>
           <a:prstGeom prst="wedgeRectCallout">
             <a:avLst>
-              <a:gd name="adj1" fmla="val -111333"/>
-              <a:gd name="adj2" fmla="val 59868"/>
+              <a:gd name="adj1" fmla="val -117833"/>
+              <a:gd name="adj2" fmla="val 127983"/>
             </a:avLst>
           </a:prstGeom>
           <a:solidFill>
@@ -12512,33 +12077,7 @@
                 <a:effectLst/>
                 <a:latin typeface="Arial" charset="0"/>
               </a:rPr>
-              <a:t>For your </a:t>
-            </a:r>
-            <a:r>
-              <a:rPr kumimoji="0" lang="en-US" sz="1600" b="0" i="0" u="none" strike="noStrike" cap="none" normalizeH="0" baseline="0" dirty="0" err="1" smtClean="0">
-                <a:ln>
-                  <a:noFill/>
-                </a:ln>
-                <a:solidFill>
-                  <a:schemeClr val="tx1"/>
-                </a:solidFill>
-                <a:effectLst/>
-                <a:latin typeface="Arial" charset="0"/>
-              </a:rPr>
-              <a:t>uC</a:t>
-            </a:r>
-            <a:r>
-              <a:rPr kumimoji="0" lang="en-US" sz="1600" b="0" i="0" u="none" strike="noStrike" cap="none" normalizeH="0" baseline="0" dirty="0" smtClean="0">
-                <a:ln>
-                  <a:noFill/>
-                </a:ln>
-                <a:solidFill>
-                  <a:schemeClr val="tx1"/>
-                </a:solidFill>
-                <a:effectLst/>
-                <a:latin typeface="Arial" charset="0"/>
-              </a:rPr>
-              <a:t>, you need to determine how fast your oscillator</a:t>
+              <a:t>Button is push</a:t>
             </a:r>
             <a:r>
               <a:rPr kumimoji="0" lang="en-US" sz="1600" b="0" i="0" u="none" strike="noStrike" cap="none" normalizeH="0" dirty="0" smtClean="0">
@@ -12551,20 +12090,7 @@
                 <a:effectLst/>
                 <a:latin typeface="Arial" charset="0"/>
               </a:rPr>
-              <a:t> is and set #0xaaaa to a value you want for </a:t>
-            </a:r>
-            <a:r>
-              <a:rPr kumimoji="0" lang="en-US" sz="1600" b="0" i="0" u="none" strike="noStrike" cap="none" normalizeH="0" dirty="0" err="1" smtClean="0">
-                <a:ln>
-                  <a:noFill/>
-                </a:ln>
-                <a:solidFill>
-                  <a:schemeClr val="tx1"/>
-                </a:solidFill>
-                <a:effectLst/>
-                <a:latin typeface="Arial" charset="0"/>
-              </a:rPr>
-              <a:t>debouncing</a:t>
+              <a:t> detected</a:t>
             </a:r>
             <a:endParaRPr kumimoji="0" lang="en-US" sz="1600" b="0" i="0" u="none" strike="noStrike" cap="none" normalizeH="0" baseline="0" dirty="0" smtClean="0">
               <a:ln>
@@ -12587,13 +12113,13 @@
         </p:nvSpPr>
         <p:spPr bwMode="auto">
           <a:xfrm>
-            <a:off x="5716577" y="4141575"/>
-            <a:ext cx="3153103" cy="1198179"/>
+            <a:off x="5716575" y="4977148"/>
+            <a:ext cx="3153103" cy="840328"/>
           </a:xfrm>
           <a:prstGeom prst="wedgeRectCallout">
             <a:avLst>
-              <a:gd name="adj1" fmla="val -110583"/>
-              <a:gd name="adj2" fmla="val -49343"/>
+              <a:gd name="adj1" fmla="val -69583"/>
+              <a:gd name="adj2" fmla="val -104688"/>
             </a:avLst>
           </a:prstGeom>
           <a:solidFill>
@@ -12645,7 +12171,7 @@
                 <a:effectLst/>
                 <a:latin typeface="Arial" charset="0"/>
               </a:rPr>
-              <a:t>It might also be useful to pass in an</a:t>
+              <a:t>Call a delay (sleep) to wait for bouncing to settle down before reading</a:t>
             </a:r>
             <a:r>
               <a:rPr kumimoji="0" lang="en-US" sz="1600" b="0" i="0" u="none" strike="noStrike" cap="none" normalizeH="0" dirty="0" smtClean="0">
@@ -12658,7 +12184,7 @@
                 <a:effectLst/>
                 <a:latin typeface="Arial" charset="0"/>
               </a:rPr>
-              <a:t> argument for how long you want to delay instead of having it hardcoded</a:t>
+              <a:t> again</a:t>
             </a:r>
             <a:endParaRPr kumimoji="0" lang="en-US" sz="1600" b="0" i="0" u="none" strike="noStrike" cap="none" normalizeH="0" baseline="0" dirty="0" smtClean="0">
               <a:ln>
@@ -12676,7 +12202,7 @@
     </p:spTree>
     <p:extLst>
       <p:ext uri="{BB962C8B-B14F-4D97-AF65-F5344CB8AC3E}">
-        <p14:creationId xmlns:p14="http://schemas.microsoft.com/office/powerpoint/2010/main" val="2686562081"/>
+        <p14:creationId xmlns:p14="http://schemas.microsoft.com/office/powerpoint/2010/main" val="2711424685"/>
       </p:ext>
     </p:extLst>
   </p:cSld>
@@ -12918,6 +12444,756 @@
       </p:grpSpPr>
       <p:sp>
         <p:nvSpPr>
+          <p:cNvPr id="2" name="Title 1"/>
+          <p:cNvSpPr>
+            <a:spLocks noGrp="1"/>
+          </p:cNvSpPr>
+          <p:nvPr>
+            <p:ph type="title"/>
+          </p:nvPr>
+        </p:nvSpPr>
+        <p:spPr/>
+        <p:txBody>
+          <a:bodyPr/>
+          <a:lstStyle/>
+          <a:p>
+            <a:r>
+              <a:rPr lang="en-US" dirty="0" err="1" smtClean="0"/>
+              <a:t>Debounced</a:t>
+            </a:r>
+            <a:r>
+              <a:rPr lang="en-US" dirty="0" smtClean="0"/>
+              <a:t> code with SW delay</a:t>
+            </a:r>
+            <a:endParaRPr lang="en-US" dirty="0"/>
+          </a:p>
+        </p:txBody>
+      </p:sp>
+      <p:sp>
+        <p:nvSpPr>
+          <p:cNvPr id="3" name="Content Placeholder 2"/>
+          <p:cNvSpPr>
+            <a:spLocks noGrp="1"/>
+          </p:cNvSpPr>
+          <p:nvPr>
+            <p:ph idx="1"/>
+          </p:nvPr>
+        </p:nvSpPr>
+        <p:spPr>
+          <a:xfrm>
+            <a:off x="708193" y="1574948"/>
+            <a:ext cx="7772400" cy="4724400"/>
+          </a:xfrm>
+        </p:spPr>
+        <p:txBody>
+          <a:bodyPr/>
+          <a:lstStyle/>
+          <a:p>
+            <a:pPr marL="0" indent="0">
+              <a:buNone/>
+            </a:pPr>
+            <a:r>
+              <a:rPr lang="en-US" sz="1400" b="1" dirty="0">
+                <a:solidFill>
+                  <a:srgbClr val="00B050"/>
+                </a:solidFill>
+                <a:latin typeface="Courier New" pitchFamily="49" charset="0"/>
+                <a:cs typeface="Courier New" pitchFamily="49" charset="0"/>
+              </a:rPr>
+              <a:t>; -------------------------------------------</a:t>
+            </a:r>
+          </a:p>
+          <a:p>
+            <a:pPr marL="0" indent="0">
+              <a:buNone/>
+            </a:pPr>
+            <a:r>
+              <a:rPr lang="en-US" sz="1400" b="1" dirty="0">
+                <a:solidFill>
+                  <a:srgbClr val="00B050"/>
+                </a:solidFill>
+                <a:latin typeface="Courier New" pitchFamily="49" charset="0"/>
+                <a:cs typeface="Courier New" pitchFamily="49" charset="0"/>
+              </a:rPr>
+              <a:t>; Software delay</a:t>
+            </a:r>
+          </a:p>
+          <a:p>
+            <a:pPr marL="0" indent="0">
+              <a:buNone/>
+            </a:pPr>
+            <a:r>
+              <a:rPr lang="en-US" sz="1400" b="1" dirty="0">
+                <a:solidFill>
+                  <a:srgbClr val="00B050"/>
+                </a:solidFill>
+                <a:latin typeface="Courier New" pitchFamily="49" charset="0"/>
+                <a:cs typeface="Courier New" pitchFamily="49" charset="0"/>
+              </a:rPr>
+              <a:t>; Purpose:  Delays code based on value of R5</a:t>
+            </a:r>
+          </a:p>
+          <a:p>
+            <a:pPr marL="0" indent="0">
+              <a:buNone/>
+            </a:pPr>
+            <a:r>
+              <a:rPr lang="en-US" sz="1400" b="1" dirty="0">
+                <a:solidFill>
+                  <a:srgbClr val="00B050"/>
+                </a:solidFill>
+                <a:latin typeface="Courier New" pitchFamily="49" charset="0"/>
+                <a:cs typeface="Courier New" pitchFamily="49" charset="0"/>
+              </a:rPr>
+              <a:t>;	</a:t>
+            </a:r>
+            <a:r>
+              <a:rPr lang="en-US" sz="1400" b="1" dirty="0" smtClean="0">
+                <a:solidFill>
+                  <a:srgbClr val="00B050"/>
+                </a:solidFill>
+                <a:latin typeface="Courier New" pitchFamily="49" charset="0"/>
+                <a:cs typeface="Courier New" pitchFamily="49" charset="0"/>
+              </a:rPr>
+              <a:t>   R5 </a:t>
+            </a:r>
+            <a:r>
+              <a:rPr lang="en-US" sz="1400" b="1" dirty="0">
+                <a:solidFill>
+                  <a:srgbClr val="00B050"/>
+                </a:solidFill>
+                <a:latin typeface="Courier New" pitchFamily="49" charset="0"/>
+                <a:cs typeface="Courier New" pitchFamily="49" charset="0"/>
+              </a:rPr>
+              <a:t>is currently hard coded as </a:t>
+            </a:r>
+            <a:r>
+              <a:rPr lang="en-US" sz="1400" b="1" dirty="0" smtClean="0">
+                <a:solidFill>
+                  <a:srgbClr val="00B050"/>
+                </a:solidFill>
+                <a:latin typeface="Courier New" pitchFamily="49" charset="0"/>
+                <a:cs typeface="Courier New" pitchFamily="49" charset="0"/>
+              </a:rPr>
+              <a:t>0xAAAA</a:t>
+            </a:r>
+          </a:p>
+          <a:p>
+            <a:pPr marL="0" indent="0">
+              <a:buNone/>
+            </a:pPr>
+            <a:r>
+              <a:rPr lang="en-US" sz="1400" dirty="0" smtClean="0">
+                <a:solidFill>
+                  <a:srgbClr val="00B050"/>
+                </a:solidFill>
+                <a:latin typeface="Courier New" pitchFamily="49" charset="0"/>
+                <a:cs typeface="Courier New" pitchFamily="49" charset="0"/>
+              </a:rPr>
+              <a:t>; Destroyed: None</a:t>
+            </a:r>
+          </a:p>
+          <a:p>
+            <a:pPr marL="0" indent="0">
+              <a:buNone/>
+            </a:pPr>
+            <a:r>
+              <a:rPr lang="en-US" sz="1400" b="1" dirty="0" smtClean="0">
+                <a:solidFill>
+                  <a:srgbClr val="00B050"/>
+                </a:solidFill>
+                <a:latin typeface="Courier New" pitchFamily="49" charset="0"/>
+                <a:cs typeface="Courier New" pitchFamily="49" charset="0"/>
+              </a:rPr>
+              <a:t>; Returned: None</a:t>
+            </a:r>
+            <a:endParaRPr lang="en-US" sz="1400" b="1" dirty="0">
+              <a:solidFill>
+                <a:srgbClr val="00B050"/>
+              </a:solidFill>
+              <a:latin typeface="Courier New" pitchFamily="49" charset="0"/>
+              <a:cs typeface="Courier New" pitchFamily="49" charset="0"/>
+            </a:endParaRPr>
+          </a:p>
+          <a:p>
+            <a:pPr marL="0" indent="0">
+              <a:buNone/>
+            </a:pPr>
+            <a:r>
+              <a:rPr lang="en-US" sz="1400" b="1" dirty="0">
+                <a:solidFill>
+                  <a:srgbClr val="00B050"/>
+                </a:solidFill>
+                <a:latin typeface="Courier New" pitchFamily="49" charset="0"/>
+                <a:cs typeface="Courier New" pitchFamily="49" charset="0"/>
+              </a:rPr>
+              <a:t>; -------------------------------------------</a:t>
+            </a:r>
+          </a:p>
+          <a:p>
+            <a:pPr marL="0" indent="0">
+              <a:buNone/>
+            </a:pPr>
+            <a:r>
+              <a:rPr lang="en-US" sz="1400" b="1" dirty="0" err="1">
+                <a:solidFill>
+                  <a:schemeClr val="accent2"/>
+                </a:solidFill>
+                <a:latin typeface="Courier New" pitchFamily="49" charset="0"/>
+                <a:cs typeface="Courier New" pitchFamily="49" charset="0"/>
+              </a:rPr>
+              <a:t>software_delay</a:t>
+            </a:r>
+            <a:r>
+              <a:rPr lang="en-US" sz="1400" b="1" dirty="0">
+                <a:solidFill>
+                  <a:schemeClr val="accent2"/>
+                </a:solidFill>
+                <a:latin typeface="Courier New" pitchFamily="49" charset="0"/>
+                <a:cs typeface="Courier New" pitchFamily="49" charset="0"/>
+              </a:rPr>
+              <a:t>:</a:t>
+            </a:r>
+          </a:p>
+          <a:p>
+            <a:pPr marL="0" indent="0">
+              <a:buNone/>
+            </a:pPr>
+            <a:r>
+              <a:rPr lang="en-US" sz="1400" b="1" dirty="0">
+                <a:solidFill>
+                  <a:schemeClr val="accent2"/>
+                </a:solidFill>
+                <a:latin typeface="Courier New" pitchFamily="49" charset="0"/>
+                <a:cs typeface="Courier New" pitchFamily="49" charset="0"/>
+              </a:rPr>
+              <a:t>		</a:t>
+            </a:r>
+            <a:r>
+              <a:rPr lang="en-US" sz="1400" b="1" dirty="0" smtClean="0">
+                <a:solidFill>
+                  <a:schemeClr val="accent2"/>
+                </a:solidFill>
+                <a:latin typeface="Courier New" pitchFamily="49" charset="0"/>
+                <a:cs typeface="Courier New" pitchFamily="49" charset="0"/>
+              </a:rPr>
+              <a:t>push </a:t>
+            </a:r>
+            <a:r>
+              <a:rPr lang="en-US" sz="1400" b="1" dirty="0">
+                <a:solidFill>
+                  <a:schemeClr val="accent2"/>
+                </a:solidFill>
+                <a:latin typeface="Courier New" pitchFamily="49" charset="0"/>
+                <a:cs typeface="Courier New" pitchFamily="49" charset="0"/>
+              </a:rPr>
+              <a:t>r5</a:t>
+            </a:r>
+          </a:p>
+          <a:p>
+            <a:pPr marL="0" indent="0">
+              <a:buNone/>
+            </a:pPr>
+            <a:r>
+              <a:rPr lang="en-US" sz="1400" b="1" dirty="0">
+                <a:solidFill>
+                  <a:schemeClr val="accent2"/>
+                </a:solidFill>
+                <a:latin typeface="Courier New" pitchFamily="49" charset="0"/>
+                <a:cs typeface="Courier New" pitchFamily="49" charset="0"/>
+              </a:rPr>
+              <a:t>		</a:t>
+            </a:r>
+            <a:r>
+              <a:rPr lang="en-US" sz="1400" b="1" dirty="0" err="1" smtClean="0">
+                <a:solidFill>
+                  <a:schemeClr val="accent2"/>
+                </a:solidFill>
+                <a:latin typeface="Courier New" pitchFamily="49" charset="0"/>
+                <a:cs typeface="Courier New" pitchFamily="49" charset="0"/>
+              </a:rPr>
+              <a:t>mov.w</a:t>
+            </a:r>
+            <a:r>
+              <a:rPr lang="en-US" sz="1400" b="1" dirty="0" smtClean="0">
+                <a:solidFill>
+                  <a:schemeClr val="accent2"/>
+                </a:solidFill>
+                <a:latin typeface="Courier New" pitchFamily="49" charset="0"/>
+                <a:cs typeface="Courier New" pitchFamily="49" charset="0"/>
+              </a:rPr>
+              <a:t> </a:t>
+            </a:r>
+            <a:r>
+              <a:rPr lang="en-US" sz="1400" b="1" dirty="0">
+                <a:solidFill>
+                  <a:schemeClr val="accent2"/>
+                </a:solidFill>
+                <a:latin typeface="Courier New" pitchFamily="49" charset="0"/>
+                <a:cs typeface="Courier New" pitchFamily="49" charset="0"/>
+              </a:rPr>
+              <a:t>#0xaaaa, r5</a:t>
+            </a:r>
+          </a:p>
+          <a:p>
+            <a:pPr marL="0" indent="0">
+              <a:buNone/>
+            </a:pPr>
+            <a:endParaRPr lang="en-US" sz="1400" b="1" dirty="0">
+              <a:solidFill>
+                <a:schemeClr val="accent2"/>
+              </a:solidFill>
+              <a:latin typeface="Courier New" pitchFamily="49" charset="0"/>
+              <a:cs typeface="Courier New" pitchFamily="49" charset="0"/>
+            </a:endParaRPr>
+          </a:p>
+          <a:p>
+            <a:pPr marL="0" indent="0">
+              <a:buNone/>
+            </a:pPr>
+            <a:r>
+              <a:rPr lang="en-US" sz="1400" b="1" dirty="0">
+                <a:solidFill>
+                  <a:schemeClr val="accent2"/>
+                </a:solidFill>
+                <a:latin typeface="Courier New" pitchFamily="49" charset="0"/>
+                <a:cs typeface="Courier New" pitchFamily="49" charset="0"/>
+              </a:rPr>
+              <a:t>delay:		</a:t>
+            </a:r>
+            <a:r>
+              <a:rPr lang="en-US" sz="1400" b="1" dirty="0" err="1" smtClean="0">
+                <a:solidFill>
+                  <a:schemeClr val="accent2"/>
+                </a:solidFill>
+                <a:latin typeface="Courier New" pitchFamily="49" charset="0"/>
+                <a:cs typeface="Courier New" pitchFamily="49" charset="0"/>
+              </a:rPr>
+              <a:t>dec</a:t>
+            </a:r>
+            <a:r>
+              <a:rPr lang="en-US" sz="1400" b="1" dirty="0" smtClean="0">
+                <a:solidFill>
+                  <a:schemeClr val="accent2"/>
+                </a:solidFill>
+                <a:latin typeface="Courier New" pitchFamily="49" charset="0"/>
+                <a:cs typeface="Courier New" pitchFamily="49" charset="0"/>
+              </a:rPr>
+              <a:t> </a:t>
+            </a:r>
+            <a:r>
+              <a:rPr lang="en-US" sz="1400" b="1" dirty="0">
+                <a:solidFill>
+                  <a:schemeClr val="accent2"/>
+                </a:solidFill>
+                <a:latin typeface="Courier New" pitchFamily="49" charset="0"/>
+                <a:cs typeface="Courier New" pitchFamily="49" charset="0"/>
+              </a:rPr>
+              <a:t>r5</a:t>
+            </a:r>
+          </a:p>
+          <a:p>
+            <a:pPr marL="0" indent="0">
+              <a:buNone/>
+            </a:pPr>
+            <a:r>
+              <a:rPr lang="en-US" sz="1400" b="1" dirty="0">
+                <a:solidFill>
+                  <a:schemeClr val="accent2"/>
+                </a:solidFill>
+                <a:latin typeface="Courier New" pitchFamily="49" charset="0"/>
+                <a:cs typeface="Courier New" pitchFamily="49" charset="0"/>
+              </a:rPr>
+              <a:t>		</a:t>
+            </a:r>
+            <a:r>
+              <a:rPr lang="en-US" sz="1400" b="1" dirty="0" err="1" smtClean="0">
+                <a:solidFill>
+                  <a:schemeClr val="accent2"/>
+                </a:solidFill>
+                <a:latin typeface="Courier New" pitchFamily="49" charset="0"/>
+                <a:cs typeface="Courier New" pitchFamily="49" charset="0"/>
+              </a:rPr>
+              <a:t>jnz</a:t>
+            </a:r>
+            <a:r>
+              <a:rPr lang="en-US" sz="1400" b="1" dirty="0" smtClean="0">
+                <a:solidFill>
+                  <a:schemeClr val="accent2"/>
+                </a:solidFill>
+                <a:latin typeface="Courier New" pitchFamily="49" charset="0"/>
+                <a:cs typeface="Courier New" pitchFamily="49" charset="0"/>
+              </a:rPr>
+              <a:t> </a:t>
+            </a:r>
+            <a:r>
+              <a:rPr lang="en-US" sz="1400" b="1" dirty="0">
+                <a:solidFill>
+                  <a:schemeClr val="accent2"/>
+                </a:solidFill>
+                <a:latin typeface="Courier New" pitchFamily="49" charset="0"/>
+                <a:cs typeface="Courier New" pitchFamily="49" charset="0"/>
+              </a:rPr>
+              <a:t>delay</a:t>
+            </a:r>
+          </a:p>
+          <a:p>
+            <a:pPr marL="0" indent="0">
+              <a:buNone/>
+            </a:pPr>
+            <a:r>
+              <a:rPr lang="en-US" sz="1400" b="1" dirty="0">
+                <a:solidFill>
+                  <a:schemeClr val="accent2"/>
+                </a:solidFill>
+                <a:latin typeface="Courier New" pitchFamily="49" charset="0"/>
+                <a:cs typeface="Courier New" pitchFamily="49" charset="0"/>
+              </a:rPr>
+              <a:t>		</a:t>
+            </a:r>
+            <a:r>
+              <a:rPr lang="en-US" sz="1400" b="1" dirty="0" smtClean="0">
+                <a:solidFill>
+                  <a:schemeClr val="accent2"/>
+                </a:solidFill>
+                <a:latin typeface="Courier New" pitchFamily="49" charset="0"/>
+                <a:cs typeface="Courier New" pitchFamily="49" charset="0"/>
+              </a:rPr>
+              <a:t>pop </a:t>
+            </a:r>
+            <a:r>
+              <a:rPr lang="en-US" sz="1400" b="1" dirty="0">
+                <a:solidFill>
+                  <a:schemeClr val="accent2"/>
+                </a:solidFill>
+                <a:latin typeface="Courier New" pitchFamily="49" charset="0"/>
+                <a:cs typeface="Courier New" pitchFamily="49" charset="0"/>
+              </a:rPr>
+              <a:t>r5</a:t>
+            </a:r>
+          </a:p>
+          <a:p>
+            <a:pPr marL="0" indent="0">
+              <a:buNone/>
+            </a:pPr>
+            <a:r>
+              <a:rPr lang="en-US" sz="1400" b="1" dirty="0">
+                <a:solidFill>
+                  <a:schemeClr val="accent2"/>
+                </a:solidFill>
+                <a:latin typeface="Courier New" pitchFamily="49" charset="0"/>
+                <a:cs typeface="Courier New" pitchFamily="49" charset="0"/>
+              </a:rPr>
+              <a:t>		</a:t>
+            </a:r>
+            <a:r>
+              <a:rPr lang="en-US" sz="1400" b="1" dirty="0" smtClean="0">
+                <a:solidFill>
+                  <a:schemeClr val="accent2"/>
+                </a:solidFill>
+                <a:latin typeface="Courier New" pitchFamily="49" charset="0"/>
+                <a:cs typeface="Courier New" pitchFamily="49" charset="0"/>
+              </a:rPr>
+              <a:t>ret</a:t>
+            </a:r>
+            <a:endParaRPr lang="en-US" sz="1400" b="1" dirty="0">
+              <a:solidFill>
+                <a:schemeClr val="accent2"/>
+              </a:solidFill>
+              <a:latin typeface="Courier New" pitchFamily="49" charset="0"/>
+              <a:cs typeface="Courier New" pitchFamily="49" charset="0"/>
+            </a:endParaRPr>
+          </a:p>
+          <a:p>
+            <a:pPr marL="0" indent="0">
+              <a:buNone/>
+            </a:pPr>
+            <a:r>
+              <a:rPr lang="en-US" sz="1400" b="1" dirty="0">
+                <a:solidFill>
+                  <a:srgbClr val="00B050"/>
+                </a:solidFill>
+                <a:latin typeface="Courier New" pitchFamily="49" charset="0"/>
+                <a:cs typeface="Courier New" pitchFamily="49" charset="0"/>
+              </a:rPr>
+              <a:t>; End Software delay ---------------------------</a:t>
+            </a:r>
+            <a:endParaRPr lang="en-US" sz="1400" b="1" dirty="0" smtClean="0">
+              <a:solidFill>
+                <a:srgbClr val="00B050"/>
+              </a:solidFill>
+              <a:latin typeface="Courier New" pitchFamily="49" charset="0"/>
+              <a:cs typeface="Courier New" pitchFamily="49" charset="0"/>
+            </a:endParaRPr>
+          </a:p>
+        </p:txBody>
+      </p:sp>
+      <p:sp>
+        <p:nvSpPr>
+          <p:cNvPr id="4" name="Rectangular Callout 3"/>
+          <p:cNvSpPr/>
+          <p:nvPr/>
+        </p:nvSpPr>
+        <p:spPr bwMode="auto">
+          <a:xfrm>
+            <a:off x="5716577" y="2648608"/>
+            <a:ext cx="3153103" cy="1198179"/>
+          </a:xfrm>
+          <a:prstGeom prst="wedgeRectCallout">
+            <a:avLst>
+              <a:gd name="adj1" fmla="val -111333"/>
+              <a:gd name="adj2" fmla="val 59868"/>
+            </a:avLst>
+          </a:prstGeom>
+          <a:solidFill>
+            <a:srgbClr val="FFFF00"/>
+          </a:solidFill>
+          <a:ln w="12700" cap="flat" cmpd="sng" algn="ctr">
+            <a:solidFill>
+              <a:schemeClr val="tx1"/>
+            </a:solidFill>
+            <a:prstDash val="solid"/>
+            <a:round/>
+            <a:headEnd type="none" w="med" len="med"/>
+            <a:tailEnd type="none" w="med" len="med"/>
+          </a:ln>
+          <a:effectLst/>
+        </p:spPr>
+        <p:txBody>
+          <a:bodyPr vert="horz" wrap="square" lIns="91440" tIns="45720" rIns="91440" bIns="45720" numCol="1" rtlCol="0" anchor="t" anchorCtr="0" compatLnSpc="1">
+            <a:prstTxWarp prst="textNoShape">
+              <a:avLst/>
+            </a:prstTxWarp>
+          </a:bodyPr>
+          <a:lstStyle/>
+          <a:p>
+            <a:pPr marL="0" marR="0" indent="0" algn="ctr" defTabSz="914400" rtl="0" eaLnBrk="0" fontAlgn="base" latinLnBrk="0" hangingPunct="0">
+              <a:lnSpc>
+                <a:spcPct val="100000"/>
+              </a:lnSpc>
+              <a:spcBef>
+                <a:spcPct val="0"/>
+              </a:spcBef>
+              <a:spcAft>
+                <a:spcPct val="0"/>
+              </a:spcAft>
+              <a:buClrTx/>
+              <a:buSzTx/>
+              <a:buFontTx/>
+              <a:buNone/>
+              <a:tabLst/>
+            </a:pPr>
+            <a:r>
+              <a:rPr kumimoji="0" lang="en-US" sz="1600" b="0" i="0" u="none" strike="noStrike" cap="none" normalizeH="0" baseline="0" dirty="0" smtClean="0">
+                <a:ln>
+                  <a:noFill/>
+                </a:ln>
+                <a:solidFill>
+                  <a:schemeClr val="tx1"/>
+                </a:solidFill>
+                <a:effectLst/>
+                <a:latin typeface="Arial" charset="0"/>
+              </a:rPr>
+              <a:t>For your </a:t>
+            </a:r>
+            <a:r>
+              <a:rPr kumimoji="0" lang="en-US" sz="1600" b="0" i="0" u="none" strike="noStrike" cap="none" normalizeH="0" baseline="0" dirty="0" err="1" smtClean="0">
+                <a:ln>
+                  <a:noFill/>
+                </a:ln>
+                <a:solidFill>
+                  <a:schemeClr val="tx1"/>
+                </a:solidFill>
+                <a:effectLst/>
+                <a:latin typeface="Arial" charset="0"/>
+              </a:rPr>
+              <a:t>uC</a:t>
+            </a:r>
+            <a:r>
+              <a:rPr kumimoji="0" lang="en-US" sz="1600" b="0" i="0" u="none" strike="noStrike" cap="none" normalizeH="0" baseline="0" dirty="0" smtClean="0">
+                <a:ln>
+                  <a:noFill/>
+                </a:ln>
+                <a:solidFill>
+                  <a:schemeClr val="tx1"/>
+                </a:solidFill>
+                <a:effectLst/>
+                <a:latin typeface="Arial" charset="0"/>
+              </a:rPr>
+              <a:t>, you need to determine how fast your oscillator</a:t>
+            </a:r>
+            <a:r>
+              <a:rPr kumimoji="0" lang="en-US" sz="1600" b="0" i="0" u="none" strike="noStrike" cap="none" normalizeH="0" dirty="0" smtClean="0">
+                <a:ln>
+                  <a:noFill/>
+                </a:ln>
+                <a:solidFill>
+                  <a:schemeClr val="tx1"/>
+                </a:solidFill>
+                <a:effectLst/>
+                <a:latin typeface="Arial" charset="0"/>
+              </a:rPr>
+              <a:t> is and set #0xaaaa to a value you want for </a:t>
+            </a:r>
+            <a:r>
+              <a:rPr kumimoji="0" lang="en-US" sz="1600" b="0" i="0" u="none" strike="noStrike" cap="none" normalizeH="0" dirty="0" err="1" smtClean="0">
+                <a:ln>
+                  <a:noFill/>
+                </a:ln>
+                <a:solidFill>
+                  <a:schemeClr val="tx1"/>
+                </a:solidFill>
+                <a:effectLst/>
+                <a:latin typeface="Arial" charset="0"/>
+              </a:rPr>
+              <a:t>debouncing</a:t>
+            </a:r>
+            <a:endParaRPr kumimoji="0" lang="en-US" sz="1600" b="0" i="0" u="none" strike="noStrike" cap="none" normalizeH="0" baseline="0" dirty="0" smtClean="0">
+              <a:ln>
+                <a:noFill/>
+              </a:ln>
+              <a:solidFill>
+                <a:schemeClr val="tx1"/>
+              </a:solidFill>
+              <a:effectLst/>
+              <a:latin typeface="Arial" charset="0"/>
+            </a:endParaRPr>
+          </a:p>
+        </p:txBody>
+      </p:sp>
+      <p:sp>
+        <p:nvSpPr>
+          <p:cNvPr id="5" name="Rectangular Callout 4"/>
+          <p:cNvSpPr/>
+          <p:nvPr/>
+        </p:nvSpPr>
+        <p:spPr bwMode="auto">
+          <a:xfrm>
+            <a:off x="5716577" y="4141575"/>
+            <a:ext cx="3153103" cy="1198179"/>
+          </a:xfrm>
+          <a:prstGeom prst="wedgeRectCallout">
+            <a:avLst>
+              <a:gd name="adj1" fmla="val -110583"/>
+              <a:gd name="adj2" fmla="val -49343"/>
+            </a:avLst>
+          </a:prstGeom>
+          <a:solidFill>
+            <a:srgbClr val="FFFF00"/>
+          </a:solidFill>
+          <a:ln w="12700" cap="flat" cmpd="sng" algn="ctr">
+            <a:solidFill>
+              <a:schemeClr val="tx1"/>
+            </a:solidFill>
+            <a:prstDash val="solid"/>
+            <a:round/>
+            <a:headEnd type="none" w="med" len="med"/>
+            <a:tailEnd type="none" w="med" len="med"/>
+          </a:ln>
+          <a:effectLst/>
+        </p:spPr>
+        <p:txBody>
+          <a:bodyPr vert="horz" wrap="square" lIns="91440" tIns="45720" rIns="91440" bIns="45720" numCol="1" rtlCol="0" anchor="t" anchorCtr="0" compatLnSpc="1">
+            <a:prstTxWarp prst="textNoShape">
+              <a:avLst/>
+            </a:prstTxWarp>
+          </a:bodyPr>
+          <a:lstStyle/>
+          <a:p>
+            <a:pPr marL="0" marR="0" indent="0" algn="ctr" defTabSz="914400" rtl="0" eaLnBrk="0" fontAlgn="base" latinLnBrk="0" hangingPunct="0">
+              <a:lnSpc>
+                <a:spcPct val="100000"/>
+              </a:lnSpc>
+              <a:spcBef>
+                <a:spcPct val="0"/>
+              </a:spcBef>
+              <a:spcAft>
+                <a:spcPct val="0"/>
+              </a:spcAft>
+              <a:buClrTx/>
+              <a:buSzTx/>
+              <a:buFontTx/>
+              <a:buNone/>
+              <a:tabLst/>
+            </a:pPr>
+            <a:r>
+              <a:rPr kumimoji="0" lang="en-US" sz="1600" b="0" i="0" u="none" strike="noStrike" cap="none" normalizeH="0" baseline="0" dirty="0" smtClean="0">
+                <a:ln>
+                  <a:noFill/>
+                </a:ln>
+                <a:solidFill>
+                  <a:schemeClr val="tx1"/>
+                </a:solidFill>
+                <a:effectLst/>
+                <a:latin typeface="Arial" charset="0"/>
+              </a:rPr>
+              <a:t>It might also be useful to pass in an</a:t>
+            </a:r>
+            <a:r>
+              <a:rPr kumimoji="0" lang="en-US" sz="1600" b="0" i="0" u="none" strike="noStrike" cap="none" normalizeH="0" dirty="0" smtClean="0">
+                <a:ln>
+                  <a:noFill/>
+                </a:ln>
+                <a:solidFill>
+                  <a:schemeClr val="tx1"/>
+                </a:solidFill>
+                <a:effectLst/>
+                <a:latin typeface="Arial" charset="0"/>
+              </a:rPr>
+              <a:t> argument for how long you want to delay instead of having it hardcoded</a:t>
+            </a:r>
+            <a:endParaRPr kumimoji="0" lang="en-US" sz="1600" b="0" i="0" u="none" strike="noStrike" cap="none" normalizeH="0" baseline="0" dirty="0" smtClean="0">
+              <a:ln>
+                <a:noFill/>
+              </a:ln>
+              <a:solidFill>
+                <a:schemeClr val="tx1"/>
+              </a:solidFill>
+              <a:effectLst/>
+              <a:latin typeface="Arial" charset="0"/>
+            </a:endParaRPr>
+          </a:p>
+        </p:txBody>
+      </p:sp>
+    </p:spTree>
+    <p:extLst>
+      <p:ext uri="{BB962C8B-B14F-4D97-AF65-F5344CB8AC3E}">
+        <p14:creationId xmlns:p14="http://schemas.microsoft.com/office/powerpoint/2010/main" val="2686562081"/>
+      </p:ext>
+    </p:extLst>
+  </p:cSld>
+  <p:clrMapOvr>
+    <a:masterClrMapping/>
+  </p:clrMapOvr>
+  <p:timing>
+    <p:tnLst>
+      <p:par>
+        <p:cTn id="1" dur="indefinite" restart="never" nodeType="tmRoot"/>
+      </p:par>
+    </p:tnLst>
+  </p:timing>
+</p:sld>
+</file>
+
+<file path=ppt/slides/slide21.xml><?xml version="1.0" encoding="utf-8"?>
+<p:sld xmlns:a="http://schemas.openxmlformats.org/drawingml/2006/main" xmlns:r="http://schemas.openxmlformats.org/officeDocument/2006/relationships" xmlns:p="http://schemas.openxmlformats.org/presentationml/2006/main">
+  <p:cSld>
+    <p:spTree>
+      <p:nvGrpSpPr>
+        <p:cNvPr id="1" name=""/>
+        <p:cNvGrpSpPr/>
+        <p:nvPr/>
+      </p:nvGrpSpPr>
+      <p:grpSpPr>
+        <a:xfrm>
+          <a:off x="0" y="0"/>
+          <a:ext cx="0" cy="0"/>
+          <a:chOff x="0" y="0"/>
+          <a:chExt cx="0" cy="0"/>
+        </a:xfrm>
+      </p:grpSpPr>
+      <p:sp>
+        <p:nvSpPr>
           <p:cNvPr id="5" name="Subtitle 4"/>
           <p:cNvSpPr>
             <a:spLocks noGrp="1"/>
@@ -12979,7 +13255,7 @@
 </p:sld>
 </file>
 
-<file path=ppt/slides/slide21.xml><?xml version="1.0" encoding="utf-8"?>
+<file path=ppt/slides/slide22.xml><?xml version="1.0" encoding="utf-8"?>
 <p:sld xmlns:a="http://schemas.openxmlformats.org/drawingml/2006/main" xmlns:r="http://schemas.openxmlformats.org/officeDocument/2006/relationships" xmlns:p="http://schemas.openxmlformats.org/presentationml/2006/main">
   <p:cSld>
     <p:spTree>
@@ -13253,7 +13529,7 @@
 </p:sld>
 </file>
 
-<file path=ppt/slides/slide22.xml><?xml version="1.0" encoding="utf-8"?>
+<file path=ppt/slides/slide23.xml><?xml version="1.0" encoding="utf-8"?>
 <p:sld xmlns:a="http://schemas.openxmlformats.org/drawingml/2006/main" xmlns:r="http://schemas.openxmlformats.org/officeDocument/2006/relationships" xmlns:p="http://schemas.openxmlformats.org/presentationml/2006/main">
   <p:cSld>
     <p:spTree>

</xml_diff>

<commit_message>
finished lab 2 :bento:
</commit_message>
<xml_diff>
--- a/source/lessons/lsn14-15/Lsn14-15.pptx
+++ b/source/lessons/lsn14-15/Lsn14-15.pptx
@@ -1374,7 +1374,7 @@
           <a:p>
             <a:fld id="{834513E8-165F-4932-9E2D-FD497CB9A4FD}" type="datetimeFigureOut">
               <a:rPr lang="en-US" smtClean="0"/>
-              <a:t>8/21/2018</a:t>
+              <a:t>9/11/2018</a:t>
             </a:fld>
             <a:endParaRPr lang="en-US"/>
           </a:p>
@@ -1651,7 +1651,7 @@
           <a:p>
             <a:fld id="{834513E8-165F-4932-9E2D-FD497CB9A4FD}" type="datetimeFigureOut">
               <a:rPr lang="en-US" smtClean="0"/>
-              <a:t>8/21/2018</a:t>
+              <a:t>9/11/2018</a:t>
             </a:fld>
             <a:endParaRPr lang="en-US"/>
           </a:p>
@@ -1904,7 +1904,7 @@
           <a:p>
             <a:fld id="{834513E8-165F-4932-9E2D-FD497CB9A4FD}" type="datetimeFigureOut">
               <a:rPr lang="en-US" smtClean="0"/>
-              <a:t>8/21/2018</a:t>
+              <a:t>9/11/2018</a:t>
             </a:fld>
             <a:endParaRPr lang="en-US"/>
           </a:p>
@@ -2074,7 +2074,7 @@
           <a:p>
             <a:fld id="{834513E8-165F-4932-9E2D-FD497CB9A4FD}" type="datetimeFigureOut">
               <a:rPr lang="en-US" smtClean="0"/>
-              <a:t>8/21/2018</a:t>
+              <a:t>9/11/2018</a:t>
             </a:fld>
             <a:endParaRPr lang="en-US"/>
           </a:p>
@@ -2254,7 +2254,7 @@
           <a:p>
             <a:fld id="{834513E8-165F-4932-9E2D-FD497CB9A4FD}" type="datetimeFigureOut">
               <a:rPr lang="en-US" smtClean="0"/>
-              <a:t>8/21/2018</a:t>
+              <a:t>9/11/2018</a:t>
             </a:fld>
             <a:endParaRPr lang="en-US"/>
           </a:p>
@@ -2998,7 +2998,7 @@
           <a:p>
             <a:fld id="{834513E8-165F-4932-9E2D-FD497CB9A4FD}" type="datetimeFigureOut">
               <a:rPr lang="en-US" smtClean="0"/>
-              <a:t>8/21/2018</a:t>
+              <a:t>9/11/2018</a:t>
             </a:fld>
             <a:endParaRPr lang="en-US"/>
           </a:p>
@@ -3168,7 +3168,7 @@
           <a:p>
             <a:fld id="{834513E8-165F-4932-9E2D-FD497CB9A4FD}" type="datetimeFigureOut">
               <a:rPr lang="en-US" smtClean="0"/>
-              <a:t>8/21/2018</a:t>
+              <a:t>9/11/2018</a:t>
             </a:fld>
             <a:endParaRPr lang="en-US"/>
           </a:p>
@@ -3414,7 +3414,7 @@
           <a:p>
             <a:fld id="{834513E8-165F-4932-9E2D-FD497CB9A4FD}" type="datetimeFigureOut">
               <a:rPr lang="en-US" smtClean="0"/>
-              <a:t>8/21/2018</a:t>
+              <a:t>9/11/2018</a:t>
             </a:fld>
             <a:endParaRPr lang="en-US"/>
           </a:p>
@@ -3646,7 +3646,7 @@
           <a:p>
             <a:fld id="{834513E8-165F-4932-9E2D-FD497CB9A4FD}" type="datetimeFigureOut">
               <a:rPr lang="en-US" smtClean="0"/>
-              <a:t>8/21/2018</a:t>
+              <a:t>9/11/2018</a:t>
             </a:fld>
             <a:endParaRPr lang="en-US"/>
           </a:p>
@@ -4013,7 +4013,7 @@
           <a:p>
             <a:fld id="{834513E8-165F-4932-9E2D-FD497CB9A4FD}" type="datetimeFigureOut">
               <a:rPr lang="en-US" smtClean="0"/>
-              <a:t>8/21/2018</a:t>
+              <a:t>9/11/2018</a:t>
             </a:fld>
             <a:endParaRPr lang="en-US"/>
           </a:p>
@@ -4131,7 +4131,7 @@
           <a:p>
             <a:fld id="{834513E8-165F-4932-9E2D-FD497CB9A4FD}" type="datetimeFigureOut">
               <a:rPr lang="en-US" smtClean="0"/>
-              <a:t>8/21/2018</a:t>
+              <a:t>9/11/2018</a:t>
             </a:fld>
             <a:endParaRPr lang="en-US"/>
           </a:p>
@@ -5947,7 +5947,7 @@
           <a:p>
             <a:fld id="{834513E8-165F-4932-9E2D-FD497CB9A4FD}" type="datetimeFigureOut">
               <a:rPr lang="en-US" smtClean="0"/>
-              <a:t>8/21/2018</a:t>
+              <a:t>9/11/2018</a:t>
             </a:fld>
             <a:endParaRPr lang="en-US"/>
           </a:p>
@@ -12032,8 +12032,8 @@
         </p:nvSpPr>
         <p:spPr>
           <a:xfrm>
-            <a:off x="365760" y="5671943"/>
-            <a:ext cx="5789983" cy="923330"/>
+            <a:off x="252512" y="5787440"/>
+            <a:ext cx="5960542" cy="646331"/>
           </a:xfrm>
           <a:prstGeom prst="rect">
             <a:avLst/>
@@ -12048,7 +12048,7 @@
           <a:p>
             <a:pPr algn="ctr"/>
             <a:r>
-              <a:rPr lang="en-US" sz="5400" b="1" cap="none" spc="0" dirty="0" smtClean="0">
+              <a:rPr lang="en-US" sz="3600" b="1" cap="none" spc="0" dirty="0" smtClean="0">
                 <a:ln w="22225">
                   <a:solidFill>
                     <a:schemeClr val="accent2"/>
@@ -12063,9 +12063,61 @@
                 </a:solidFill>
                 <a:effectLst/>
               </a:rPr>
-              <a:t>Go To Lab for ICE</a:t>
-            </a:r>
-            <a:endParaRPr lang="en-US" sz="5400" b="1" cap="none" spc="0" dirty="0">
+              <a:t>Go To Lab for </a:t>
+            </a:r>
+            <a:r>
+              <a:rPr lang="en-US" sz="3600" b="1" cap="none" spc="0" dirty="0" smtClean="0">
+                <a:ln w="22225">
+                  <a:solidFill>
+                    <a:schemeClr val="accent2"/>
+                  </a:solidFill>
+                  <a:prstDash val="solid"/>
+                </a:ln>
+                <a:solidFill>
+                  <a:schemeClr val="accent2">
+                    <a:lumMod val="40000"/>
+                    <a:lumOff val="60000"/>
+                  </a:schemeClr>
+                </a:solidFill>
+                <a:effectLst/>
+              </a:rPr>
+              <a:t>ICE3</a:t>
+            </a:r>
+            <a:r>
+              <a:rPr lang="en-US" sz="3600" b="1" dirty="0">
+                <a:ln w="22225">
+                  <a:solidFill>
+                    <a:schemeClr val="accent2"/>
+                  </a:solidFill>
+                  <a:prstDash val="solid"/>
+                </a:ln>
+                <a:solidFill>
+                  <a:schemeClr val="accent2">
+                    <a:lumMod val="40000"/>
+                    <a:lumOff val="60000"/>
+                  </a:schemeClr>
+                </a:solidFill>
+              </a:rPr>
+              <a:t> </a:t>
+            </a:r>
+            <a:r>
+              <a:rPr lang="en-US" sz="3600" b="1" dirty="0" smtClean="0">
+                <a:ln w="22225">
+                  <a:solidFill>
+                    <a:schemeClr val="accent2"/>
+                  </a:solidFill>
+                  <a:prstDash val="solid"/>
+                </a:ln>
+                <a:solidFill>
+                  <a:schemeClr val="accent2">
+                    <a:lumMod val="40000"/>
+                    <a:lumOff val="60000"/>
+                  </a:schemeClr>
+                </a:solidFill>
+              </a:rPr>
+              <a:t>(graded)</a:t>
+            </a:r>
+            <a:endParaRPr lang="en-US" sz="3600" b="1" cap="none" spc="0" dirty="0" smtClean="0">
               <a:ln w="22225">
                 <a:solidFill>
                   <a:schemeClr val="accent2"/>
@@ -12918,30 +12970,13 @@
             <a:pPr lvl="1"/>
             <a:r>
               <a:rPr lang="en-US" dirty="0" smtClean="0"/>
-              <a:t>Use the DCO calibration </a:t>
-            </a:r>
-            <a:r>
-              <a:rPr lang="en-US" dirty="0" err="1" smtClean="0"/>
-              <a:t>asm</a:t>
-            </a:r>
-            <a:r>
-              <a:rPr lang="en-US" dirty="0" smtClean="0"/>
-              <a:t> (on website for this lesson) to measure your button’s bounce</a:t>
-            </a:r>
-          </a:p>
-          <a:p>
-            <a:pPr lvl="2"/>
-            <a:r>
-              <a:rPr lang="en-US" dirty="0" smtClean="0"/>
-              <a:t>You will need to use a logic analyzer</a:t>
-            </a:r>
-          </a:p>
-          <a:p>
-            <a:pPr lvl="1"/>
-            <a:r>
-              <a:rPr lang="en-US" dirty="0" smtClean="0"/>
-              <a:t>Write a SW delay as discussed in class</a:t>
-            </a:r>
+              <a:t>Do the ICE from the website </a:t>
+            </a:r>
+            <a:r>
+              <a:rPr lang="en-US" smtClean="0"/>
+              <a:t>for this lesson</a:t>
+            </a:r>
+            <a:endParaRPr lang="en-US" dirty="0" smtClean="0"/>
           </a:p>
         </p:txBody>
       </p:sp>

</xml_diff>